<commit_message>
work on pos-creator pres feedback
</commit_message>
<xml_diff>
--- a/for-poscreators/presentation/media/lead-presentation-creator-de.pptx
+++ b/for-poscreators/presentation/media/lead-presentation-creator-de.pptx
@@ -6265,7 +6265,7 @@
           <a:p>
             <a:fld id="{E52F4C69-7549-4A71-BB0C-341D25F594E8}" type="datetime1">
               <a:rPr lang="de-AT" smtClean="0"/>
-              <a:t>30.09.20</a:t>
+              <a:t>19.10.20</a:t>
             </a:fld>
             <a:endParaRPr lang="de-AT" dirty="0"/>
           </a:p>
@@ -6685,7 +6685,15 @@
             </a:pPr>
             <a:r>
               <a:rPr lang="de-DE" noProof="0" dirty="0"/>
-              <a:t>Das  POS System baut den Request auf und sendet die Daten an die sign-Methode der ft.Middleware.</a:t>
+              <a:t>Das  POS System baut den Request auf und sendet die Daten über die </a:t>
+            </a:r>
+            <a:r>
+              <a:rPr lang="de-DE" noProof="0" dirty="0" err="1"/>
+              <a:t>sign</a:t>
+            </a:r>
+            <a:r>
+              <a:rPr lang="de-DE" noProof="0" dirty="0"/>
+              <a:t>-Methode an die Queue. Die ft.Middleware prozessiert die Daten, sorgt für die Verkettung, Speicherung, Signierung und Archivierung der Daten</a:t>
             </a:r>
           </a:p>
           <a:p>
@@ -6694,43 +6702,7 @@
             </a:pPr>
             <a:r>
               <a:rPr lang="de-DE" noProof="0" dirty="0"/>
-              <a:t>Die ft.Middleware prozessiert die Daten, verkettet diese mit Hilfe des internen ft.SecurityMechanism und entscheidet wie sie weiter verarbeitet werden sollen</a:t>
-            </a:r>
-          </a:p>
-          <a:p>
-            <a:pPr marL="228600" indent="-228600">
-              <a:buAutoNum type="arabicPeriod"/>
-            </a:pPr>
-            <a:r>
-              <a:rPr lang="de-DE" noProof="0" dirty="0"/>
-              <a:t>Zum Signieren, werden die relevanten Daten an die angeschossene TSE übertragen und von dieser signiert.</a:t>
-            </a:r>
-          </a:p>
-          <a:p>
-            <a:pPr marL="228600" indent="-228600">
-              <a:buAutoNum type="arabicPeriod"/>
-            </a:pPr>
-            <a:r>
-              <a:rPr lang="de-DE" noProof="0" dirty="0"/>
-              <a:t>Die Daten werden von der ft.Middleware persistiert und alle 5 Minuten an den fiskaltrust „Helipad“ Server zur Archivierung gesendet.</a:t>
-            </a:r>
-          </a:p>
-          <a:p>
-            <a:pPr marL="228600" indent="-228600">
-              <a:buAutoNum type="arabicPeriod"/>
-            </a:pPr>
-            <a:r>
-              <a:rPr lang="de-DE" noProof="0" dirty="0"/>
-              <a:t>Der Response wird erstellt und zurück an das  POS System gesendet (der Response beinhaltet wichtige Daten, die auf den Beleg gedruckt werden müssen)</a:t>
-            </a:r>
-          </a:p>
-          <a:p>
-            <a:pPr marL="228600" indent="-228600">
-              <a:buAutoNum type="arabicPeriod"/>
-            </a:pPr>
-            <a:r>
-              <a:rPr lang="de-DE" noProof="0" dirty="0"/>
-              <a:t>Das  POS System erhält den Response und prozessiert die darin enthaltenen Daten</a:t>
+              <a:t>Das  POS System erhält den Response und prozessiert die darin enthaltenen Daten, die wichtig für den Belegdruck sind.</a:t>
             </a:r>
           </a:p>
           <a:p>
@@ -9492,7 +9464,7 @@
                 <a:ea typeface="+mn-ea"/>
                 <a:cs typeface="+mn-cs"/>
               </a:rPr>
-              <a:t>Ab dem 1.1.2020 gelten neue Vorschriften für elektronische Aufzeichnungssysteme, die Kassenfunktion haben:</a:t>
+              <a:t>Seit dem 1.1.2020 gelten neue Vorschriften für elektronische Aufzeichnungssysteme, die Kassenfunktion haben:</a:t>
             </a:r>
           </a:p>
           <a:p>
@@ -10114,7 +10086,7 @@
           <a:p>
             <a:r>
               <a:rPr lang="de-DE" noProof="0" dirty="0"/>
-              <a:t>Das Kassensystem kommuniziert mit der ft.Middleware über das iPOS Interface. </a:t>
+              <a:t>Das Kassensystem kommuniziert mit der ft.Middleware Komponente „Queue“ über das iPOS Interface. </a:t>
             </a:r>
           </a:p>
           <a:p>
@@ -10162,13 +10134,13 @@
           <a:p>
             <a:r>
               <a:rPr lang="de-DE" noProof="0" dirty="0"/>
-              <a:t>Die Requests werden im ft.SecurityMechanism bearbeitet. Dieser kümmert sich um die Erstellung der eindeutigen, fortlaufenden Belegnummer, um die Verkettung, Signierung und die Persistenz der Daten.</a:t>
+              <a:t>Die Requests werden im ft.SecurityMechanism bearbeitet. Dieser ist ein Teil der Queue und kümmert sich um die Erstellung der eindeutigen, fortlaufenden Belegnummer, um die Verkettung der Belegdaten und die Persistenz der Daten.</a:t>
             </a:r>
           </a:p>
           <a:p>
             <a:r>
               <a:rPr lang="de-DE" noProof="0" dirty="0"/>
-              <a:t>Der ft.SecurityMechanism übernimmt die länderspezifische Implementierung der Sicherheitslösung (z.B. in Deutschland mit Hilfe einer TSE Ihrer Wahl)</a:t>
+              <a:t>Die SCU übernimmt die länderspezifische Implementierung der Sicherheitslösung (z.B. in Deutschland mit Hilfe einer TSE Ihrer Wahl)</a:t>
             </a:r>
           </a:p>
         </p:txBody>
@@ -10272,13 +10244,13 @@
           <a:p>
             <a:r>
               <a:rPr lang="de-DE" noProof="0" dirty="0"/>
-              <a:t>Das Kassensystem sendet eine mit XML oder JSON formatierte Nachricht als Request über die echo Methode des IPOS Interface an die ft.Middleware. </a:t>
+              <a:t>Das Kassensystem sendet eine mit XML oder JSON formatierte Nachricht als Request über die echo Methode des IPOS Interface an die Queue. </a:t>
             </a:r>
           </a:p>
           <a:p>
             <a:r>
               <a:rPr lang="de-DE" noProof="0" dirty="0"/>
-              <a:t>Ist die ft.Middleware erreichbar, so sendet diese die gleiche Nachricht im Response zurück.</a:t>
+              <a:t>Ist die Queue erreichbar, so sendet diese die gleiche Nachricht im Response zurück.</a:t>
             </a:r>
           </a:p>
         </p:txBody>
@@ -10382,7 +10354,7 @@
           <a:p>
             <a:r>
               <a:rPr lang="de-DE" noProof="0" dirty="0"/>
-              <a:t>Das Kassensystem sendet mit XML oder JSON formatierte Daten über die sign Methode des IPOS Interface an die ft.Middleware.</a:t>
+              <a:t>Das Kassensystem sendet mit XML oder JSON formatierte Daten über die sign Methode des IPOS Interface an die Queue.</a:t>
             </a:r>
           </a:p>
           <a:p>
@@ -10418,7 +10390,7 @@
           <a:p>
             <a:r>
               <a:rPr lang="de-DE" noProof="0" dirty="0"/>
-              <a:t>Die ft.Middleware prozessiert die Daten und sendet Response-Daten </a:t>
+              <a:t>Die Queue prozessiert die Daten, fordert Transaktionsnummer und Signaturen von der SCU an und sendet danach die Response-Daten </a:t>
             </a:r>
             <a:r>
               <a:rPr lang="de-DE" b="0" noProof="0" dirty="0"/>
@@ -10428,7 +10400,7 @@
           <a:p>
             <a:r>
               <a:rPr lang="de-DE" b="1" noProof="0" dirty="0"/>
-              <a:t>Die initial an die ft.Middleware gesendeten Charge- und PayItem Blöcke werden nicht zurückgesendet</a:t>
+              <a:t>Die initial an die Queue gesendeten Charge- und PayItem Blöcke werden nicht zurückgesendet</a:t>
             </a:r>
             <a:r>
               <a:rPr lang="de-DE" b="0" noProof="0" dirty="0"/>
@@ -10438,7 +10410,15 @@
           <a:p>
             <a:r>
               <a:rPr lang="de-DE" b="0" noProof="0" dirty="0"/>
-              <a:t>Bsp. Response-Headerdaten: Identifikation der Verarbeitungskette (Queue), </a:t>
+              <a:t>Bsp. Response-Headerdaten: Identifikation der Verarbeitungskette (Queue-</a:t>
+            </a:r>
+            <a:r>
+              <a:rPr lang="de-DE" b="0" noProof="0" dirty="0" err="1"/>
+              <a:t>Id</a:t>
+            </a:r>
+            <a:r>
+              <a:rPr lang="de-DE" b="0" noProof="0" dirty="0"/>
+              <a:t>), </a:t>
             </a:r>
             <a:r>
               <a:rPr lang="de-DE" noProof="0" dirty="0"/>
@@ -12551,33 +12531,6 @@
       </p:sp>
       <p:pic>
         <p:nvPicPr>
-          <p:cNvPr id="5" name="Content Placeholder 4">
-            <a:extLst>
-              <a:ext uri="{FF2B5EF4-FFF2-40B4-BE49-F238E27FC236}">
-                <a16:creationId xmlns:a16="http://schemas.microsoft.com/office/drawing/2014/main" id="{AAD9D593-4D41-3A4A-9513-9042BB107570}"/>
-              </a:ext>
-            </a:extLst>
-          </p:cNvPr>
-          <p:cNvPicPr>
-            <a:picLocks noGrp="1" noChangeAspect="1"/>
-          </p:cNvPicPr>
-          <p:nvPr>
-            <p:ph idx="1"/>
-          </p:nvPr>
-        </p:nvPicPr>
-        <p:blipFill>
-          <a:blip r:embed="rId3"/>
-          <a:stretch/>
-        </p:blipFill>
-        <p:spPr>
-          <a:xfrm>
-            <a:off x="787311" y="1154113"/>
-            <a:ext cx="10661827" cy="5100637"/>
-          </a:xfrm>
-        </p:spPr>
-      </p:pic>
-      <p:pic>
-        <p:nvPicPr>
           <p:cNvPr id="6" name="Grafik 12" descr="Ein Bild, das Zeichnung, Schild enthält.&#10;&#10;Automatisch generierte Beschreibung">
             <a:extLst>
               <a:ext uri="{FF2B5EF4-FFF2-40B4-BE49-F238E27FC236}">
@@ -12591,7 +12544,7 @@
           <p:nvPr/>
         </p:nvPicPr>
         <p:blipFill>
-          <a:blip r:embed="rId4">
+          <a:blip r:embed="rId3">
             <a:extLst>
               <a:ext uri="{28A0092B-C50C-407E-A947-70E740481C1C}">
                 <a14:useLocalDpi xmlns:a14="http://schemas.microsoft.com/office/drawing/2010/main" val="0"/>
@@ -12627,7 +12580,7 @@
           <p:nvPr/>
         </p:nvPicPr>
         <p:blipFill rotWithShape="1">
-          <a:blip r:embed="rId5">
+          <a:blip r:embed="rId4">
             <a:alphaModFix amt="15000"/>
             <a:extLst>
               <a:ext uri="{28A0092B-C50C-407E-A947-70E740481C1C}">
@@ -12642,6 +12595,42 @@
           <a:xfrm>
             <a:off x="10313964" y="5093305"/>
             <a:ext cx="1886400" cy="1801618"/>
+          </a:xfrm>
+          <a:prstGeom prst="rect">
+            <a:avLst/>
+          </a:prstGeom>
+        </p:spPr>
+      </p:pic>
+      <p:pic>
+        <p:nvPicPr>
+          <p:cNvPr id="11" name="Picture 10" descr="A picture containing diagram&#10;&#10;Description automatically generated">
+            <a:extLst>
+              <a:ext uri="{FF2B5EF4-FFF2-40B4-BE49-F238E27FC236}">
+                <a16:creationId xmlns:a16="http://schemas.microsoft.com/office/drawing/2014/main" id="{039F7D29-D1D6-064F-819A-6B1E2B20476A}"/>
+              </a:ext>
+            </a:extLst>
+          </p:cNvPr>
+          <p:cNvPicPr>
+            <a:picLocks noChangeAspect="1"/>
+          </p:cNvPicPr>
+          <p:nvPr/>
+        </p:nvPicPr>
+        <p:blipFill>
+          <a:blip r:embed="rId5">
+            <a:extLst>
+              <a:ext uri="{28A0092B-C50C-407E-A947-70E740481C1C}">
+                <a14:useLocalDpi xmlns:a14="http://schemas.microsoft.com/office/drawing/2010/main" val="0"/>
+              </a:ext>
+            </a:extLst>
+          </a:blip>
+          <a:stretch>
+            <a:fillRect/>
+          </a:stretch>
+        </p:blipFill>
+        <p:spPr>
+          <a:xfrm>
+            <a:off x="784412" y="1025109"/>
+            <a:ext cx="10623176" cy="4329735"/>
           </a:xfrm>
           <a:prstGeom prst="rect">
             <a:avLst/>
@@ -13735,33 +13724,6 @@
       </p:sp>
       <p:pic>
         <p:nvPicPr>
-          <p:cNvPr id="5" name="Content Placeholder 4">
-            <a:extLst>
-              <a:ext uri="{FF2B5EF4-FFF2-40B4-BE49-F238E27FC236}">
-                <a16:creationId xmlns:a16="http://schemas.microsoft.com/office/drawing/2014/main" id="{AAD9D593-4D41-3A4A-9513-9042BB107570}"/>
-              </a:ext>
-            </a:extLst>
-          </p:cNvPr>
-          <p:cNvPicPr>
-            <a:picLocks noGrp="1" noChangeAspect="1"/>
-          </p:cNvPicPr>
-          <p:nvPr>
-            <p:ph idx="1"/>
-          </p:nvPr>
-        </p:nvPicPr>
-        <p:blipFill>
-          <a:blip r:embed="rId3"/>
-          <a:stretch/>
-        </p:blipFill>
-        <p:spPr>
-          <a:xfrm>
-            <a:off x="577850" y="1971640"/>
-            <a:ext cx="11080750" cy="3465583"/>
-          </a:xfrm>
-        </p:spPr>
-      </p:pic>
-      <p:pic>
-        <p:nvPicPr>
           <p:cNvPr id="6" name="Grafik 12" descr="Ein Bild, das Zeichnung, Schild enthält.&#10;&#10;Automatisch generierte Beschreibung">
             <a:extLst>
               <a:ext uri="{FF2B5EF4-FFF2-40B4-BE49-F238E27FC236}">
@@ -13775,7 +13737,7 @@
           <p:nvPr/>
         </p:nvPicPr>
         <p:blipFill>
-          <a:blip r:embed="rId4">
+          <a:blip r:embed="rId3">
             <a:extLst>
               <a:ext uri="{28A0092B-C50C-407E-A947-70E740481C1C}">
                 <a14:useLocalDpi xmlns:a14="http://schemas.microsoft.com/office/drawing/2010/main" val="0"/>
@@ -13811,7 +13773,7 @@
           <p:nvPr/>
         </p:nvPicPr>
         <p:blipFill rotWithShape="1">
-          <a:blip r:embed="rId5">
+          <a:blip r:embed="rId4">
             <a:alphaModFix amt="15000"/>
             <a:extLst>
               <a:ext uri="{28A0092B-C50C-407E-A947-70E740481C1C}">
@@ -13832,64 +13794,42 @@
           </a:prstGeom>
         </p:spPr>
       </p:pic>
-      <p:sp>
-        <p:nvSpPr>
-          <p:cNvPr id="8" name="Rectangle 7">
+      <p:pic>
+        <p:nvPicPr>
+          <p:cNvPr id="10" name="Picture 9" descr="A picture containing diagram&#10;&#10;Description automatically generated">
             <a:extLst>
               <a:ext uri="{FF2B5EF4-FFF2-40B4-BE49-F238E27FC236}">
-                <a16:creationId xmlns:a16="http://schemas.microsoft.com/office/drawing/2014/main" id="{6711A79D-4927-DD43-B3BA-51BCDE0AC7FD}"/>
+                <a16:creationId xmlns:a16="http://schemas.microsoft.com/office/drawing/2014/main" id="{C958576E-2164-4145-8A4F-CAE86C6F837C}"/>
               </a:ext>
             </a:extLst>
           </p:cNvPr>
-          <p:cNvSpPr/>
+          <p:cNvPicPr>
+            <a:picLocks noChangeAspect="1"/>
+          </p:cNvPicPr>
           <p:nvPr/>
-        </p:nvSpPr>
+        </p:nvPicPr>
+        <p:blipFill>
+          <a:blip r:embed="rId5">
+            <a:extLst>
+              <a:ext uri="{28A0092B-C50C-407E-A947-70E740481C1C}">
+                <a14:useLocalDpi xmlns:a14="http://schemas.microsoft.com/office/drawing/2010/main" val="0"/>
+              </a:ext>
+            </a:extLst>
+          </a:blip>
+          <a:stretch>
+            <a:fillRect/>
+          </a:stretch>
+        </p:blipFill>
         <p:spPr>
           <a:xfrm>
-            <a:off x="5307130" y="3820919"/>
-            <a:ext cx="1635511" cy="1338145"/>
+            <a:off x="394447" y="1789350"/>
+            <a:ext cx="11403106" cy="4059131"/>
           </a:xfrm>
           <a:prstGeom prst="rect">
             <a:avLst/>
           </a:prstGeom>
-          <a:solidFill>
-            <a:srgbClr val="00A7CE"/>
-          </a:solidFill>
         </p:spPr>
-        <p:style>
-          <a:lnRef idx="2">
-            <a:schemeClr val="accent1">
-              <a:shade val="50000"/>
-            </a:schemeClr>
-          </a:lnRef>
-          <a:fillRef idx="1">
-            <a:schemeClr val="accent1"/>
-          </a:fillRef>
-          <a:effectRef idx="0">
-            <a:schemeClr val="accent1"/>
-          </a:effectRef>
-          <a:fontRef idx="minor">
-            <a:schemeClr val="lt1"/>
-          </a:fontRef>
-        </p:style>
-        <p:txBody>
-          <a:bodyPr rtlCol="0" anchor="ctr"/>
-          <a:lstStyle/>
-          <a:p>
-            <a:pPr algn="ctr"/>
-            <a:r>
-              <a:rPr lang="en-US" sz="1600" dirty="0">
-                <a:latin typeface="Roboto"/>
-                <a:cs typeface="Calibri"/>
-              </a:rPr>
-              <a:t>ft. Middleware</a:t>
-            </a:r>
-            <a:endParaRPr lang="en-US" sz="1600">
-              <a:latin typeface="Roboto"/>
-            </a:endParaRPr>
-          </a:p>
-        </p:txBody>
-      </p:sp>
+      </p:pic>
     </p:spTree>
     <p:extLst>
       <p:ext uri="{BB962C8B-B14F-4D97-AF65-F5344CB8AC3E}">
@@ -18178,95 +18118,6 @@
           </a:p>
         </p:txBody>
       </p:sp>
-      <p:pic>
-        <p:nvPicPr>
-          <p:cNvPr id="3" name="Picture 3">
-            <a:extLst>
-              <a:ext uri="{FF2B5EF4-FFF2-40B4-BE49-F238E27FC236}">
-                <a16:creationId xmlns:a16="http://schemas.microsoft.com/office/drawing/2014/main" id="{F78A4900-33EE-4B1B-B0D9-47FA3FB4FFD2}"/>
-              </a:ext>
-            </a:extLst>
-          </p:cNvPr>
-          <p:cNvPicPr>
-            <a:picLocks noChangeAspect="1"/>
-          </p:cNvPicPr>
-          <p:nvPr/>
-        </p:nvPicPr>
-        <p:blipFill>
-          <a:blip r:embed="rId3"/>
-          <a:stretch>
-            <a:fillRect/>
-          </a:stretch>
-        </p:blipFill>
-        <p:spPr>
-          <a:xfrm>
-            <a:off x="582186" y="1319561"/>
-            <a:ext cx="3352800" cy="4762500"/>
-          </a:xfrm>
-          <a:prstGeom prst="rect">
-            <a:avLst/>
-          </a:prstGeom>
-        </p:spPr>
-      </p:pic>
-      <p:pic>
-        <p:nvPicPr>
-          <p:cNvPr id="4" name="Picture 6">
-            <a:extLst>
-              <a:ext uri="{FF2B5EF4-FFF2-40B4-BE49-F238E27FC236}">
-                <a16:creationId xmlns:a16="http://schemas.microsoft.com/office/drawing/2014/main" id="{C3CF41BA-1BF7-4044-903B-C800C8D2CBF8}"/>
-              </a:ext>
-            </a:extLst>
-          </p:cNvPr>
-          <p:cNvPicPr>
-            <a:picLocks noChangeAspect="1"/>
-          </p:cNvPicPr>
-          <p:nvPr/>
-        </p:nvPicPr>
-        <p:blipFill>
-          <a:blip r:embed="rId4"/>
-          <a:stretch>
-            <a:fillRect/>
-          </a:stretch>
-        </p:blipFill>
-        <p:spPr>
-          <a:xfrm>
-            <a:off x="3933825" y="1353769"/>
-            <a:ext cx="4914900" cy="4369537"/>
-          </a:xfrm>
-          <a:prstGeom prst="rect">
-            <a:avLst/>
-          </a:prstGeom>
-        </p:spPr>
-      </p:pic>
-      <p:pic>
-        <p:nvPicPr>
-          <p:cNvPr id="10" name="Picture 10">
-            <a:extLst>
-              <a:ext uri="{FF2B5EF4-FFF2-40B4-BE49-F238E27FC236}">
-                <a16:creationId xmlns:a16="http://schemas.microsoft.com/office/drawing/2014/main" id="{7ADFA6BE-7B6B-4DEE-866A-AE12AC7FBACC}"/>
-              </a:ext>
-            </a:extLst>
-          </p:cNvPr>
-          <p:cNvPicPr>
-            <a:picLocks noChangeAspect="1"/>
-          </p:cNvPicPr>
-          <p:nvPr/>
-        </p:nvPicPr>
-        <p:blipFill rotWithShape="1">
-          <a:blip r:embed="rId5"/>
-          <a:srcRect t="7184" r="5612" b="2586"/>
-          <a:stretch/>
-        </p:blipFill>
-        <p:spPr>
-          <a:xfrm>
-            <a:off x="8972550" y="1762125"/>
-            <a:ext cx="2381250" cy="4038601"/>
-          </a:xfrm>
-          <a:prstGeom prst="rect">
-            <a:avLst/>
-          </a:prstGeom>
-        </p:spPr>
-      </p:pic>
       <p:sp>
         <p:nvSpPr>
           <p:cNvPr id="12" name="Rectangle: Rounded Corners 11">
@@ -18321,42 +18172,6 @@
           </a:p>
         </p:txBody>
       </p:sp>
-      <p:cxnSp>
-        <p:nvCxnSpPr>
-          <p:cNvPr id="15" name="Straight Arrow Connector 14">
-            <a:extLst>
-              <a:ext uri="{FF2B5EF4-FFF2-40B4-BE49-F238E27FC236}">
-                <a16:creationId xmlns:a16="http://schemas.microsoft.com/office/drawing/2014/main" id="{207FEDAF-1C8B-43D3-A3B3-33263CD6F926}"/>
-              </a:ext>
-            </a:extLst>
-          </p:cNvPr>
-          <p:cNvCxnSpPr/>
-          <p:nvPr/>
-        </p:nvCxnSpPr>
-        <p:spPr>
-          <a:xfrm>
-            <a:off x="11344275" y="2867025"/>
-            <a:ext cx="0" cy="1666875"/>
-          </a:xfrm>
-          <a:prstGeom prst="straightConnector1">
-            <a:avLst/>
-          </a:prstGeom>
-        </p:spPr>
-        <p:style>
-          <a:lnRef idx="2">
-            <a:schemeClr val="accent3"/>
-          </a:lnRef>
-          <a:fillRef idx="0">
-            <a:schemeClr val="accent3"/>
-          </a:fillRef>
-          <a:effectRef idx="1">
-            <a:schemeClr val="accent3"/>
-          </a:effectRef>
-          <a:fontRef idx="minor">
-            <a:schemeClr val="tx1"/>
-          </a:fontRef>
-        </p:style>
-      </p:cxnSp>
       <p:pic>
         <p:nvPicPr>
           <p:cNvPr id="8" name="Grafik 12" descr="Ein Bild, das Zeichnung, Schild enthält.&#10;&#10;Automatisch generierte Beschreibung">
@@ -18372,7 +18187,7 @@
           <p:nvPr/>
         </p:nvPicPr>
         <p:blipFill>
-          <a:blip r:embed="rId6">
+          <a:blip r:embed="rId3">
             <a:extLst>
               <a:ext uri="{28A0092B-C50C-407E-A947-70E740481C1C}">
                 <a14:useLocalDpi xmlns:a14="http://schemas.microsoft.com/office/drawing/2010/main" val="0"/>
@@ -18408,7 +18223,7 @@
           <p:nvPr/>
         </p:nvPicPr>
         <p:blipFill rotWithShape="1">
-          <a:blip r:embed="rId7">
+          <a:blip r:embed="rId4">
             <a:alphaModFix amt="15000"/>
             <a:extLst>
               <a:ext uri="{28A0092B-C50C-407E-A947-70E740481C1C}">
@@ -18423,6 +18238,42 @@
           <a:xfrm>
             <a:off x="10313964" y="5093305"/>
             <a:ext cx="1886400" cy="1801618"/>
+          </a:xfrm>
+          <a:prstGeom prst="rect">
+            <a:avLst/>
+          </a:prstGeom>
+        </p:spPr>
+      </p:pic>
+      <p:pic>
+        <p:nvPicPr>
+          <p:cNvPr id="6" name="Picture 5" descr="Diagram&#10;&#10;Description automatically generated">
+            <a:extLst>
+              <a:ext uri="{FF2B5EF4-FFF2-40B4-BE49-F238E27FC236}">
+                <a16:creationId xmlns:a16="http://schemas.microsoft.com/office/drawing/2014/main" id="{8CD46450-50B4-7A40-8CF0-E3F911992441}"/>
+              </a:ext>
+            </a:extLst>
+          </p:cNvPr>
+          <p:cNvPicPr>
+            <a:picLocks noChangeAspect="1"/>
+          </p:cNvPicPr>
+          <p:nvPr/>
+        </p:nvPicPr>
+        <p:blipFill>
+          <a:blip r:embed="rId5">
+            <a:extLst>
+              <a:ext uri="{28A0092B-C50C-407E-A947-70E740481C1C}">
+                <a14:useLocalDpi xmlns:a14="http://schemas.microsoft.com/office/drawing/2010/main" val="0"/>
+              </a:ext>
+            </a:extLst>
+          </a:blip>
+          <a:stretch>
+            <a:fillRect/>
+          </a:stretch>
+        </p:blipFill>
+        <p:spPr>
+          <a:xfrm>
+            <a:off x="576212" y="2063082"/>
+            <a:ext cx="10680952" cy="3679992"/>
           </a:xfrm>
           <a:prstGeom prst="rect">
             <a:avLst/>
@@ -18491,37 +18342,10 @@
       </p:sp>
       <p:pic>
         <p:nvPicPr>
-          <p:cNvPr id="5" name="Content Placeholder 4">
+          <p:cNvPr id="9" name="Grafik 12" descr="Ein Bild, das Zeichnung, Schild enthält.&#10;&#10;Automatisch generierte Beschreibung">
             <a:extLst>
               <a:ext uri="{FF2B5EF4-FFF2-40B4-BE49-F238E27FC236}">
-                <a16:creationId xmlns:a16="http://schemas.microsoft.com/office/drawing/2014/main" id="{AAD9D593-4D41-3A4A-9513-9042BB107570}"/>
-              </a:ext>
-            </a:extLst>
-          </p:cNvPr>
-          <p:cNvPicPr>
-            <a:picLocks noGrp="1" noChangeAspect="1"/>
-          </p:cNvPicPr>
-          <p:nvPr>
-            <p:ph idx="1"/>
-          </p:nvPr>
-        </p:nvPicPr>
-        <p:blipFill>
-          <a:blip r:embed="rId3"/>
-          <a:stretch/>
-        </p:blipFill>
-        <p:spPr>
-          <a:xfrm>
-            <a:off x="577850" y="1971640"/>
-            <a:ext cx="11080750" cy="3465583"/>
-          </a:xfrm>
-        </p:spPr>
-      </p:pic>
-      <p:pic>
-        <p:nvPicPr>
-          <p:cNvPr id="4" name="Grafik 3" descr="Ein Bild, das Zeichnung enthält.&#10;&#10;Automatisch generierte Beschreibung">
-            <a:extLst>
-              <a:ext uri="{FF2B5EF4-FFF2-40B4-BE49-F238E27FC236}">
-                <a16:creationId xmlns:a16="http://schemas.microsoft.com/office/drawing/2014/main" id="{96241C47-7250-41D7-A174-2A015A7189F6}"/>
+                <a16:creationId xmlns:a16="http://schemas.microsoft.com/office/drawing/2014/main" id="{A87FD192-152D-974F-8994-042665E8389D}"/>
               </a:ext>
             </a:extLst>
           </p:cNvPr>
@@ -18531,137 +18355,7 @@
           <p:nvPr/>
         </p:nvPicPr>
         <p:blipFill>
-          <a:blip r:embed="rId4">
-            <a:extLst>
-              <a:ext uri="{28A0092B-C50C-407E-A947-70E740481C1C}">
-                <a14:useLocalDpi xmlns:a14="http://schemas.microsoft.com/office/drawing/2010/main" val="0"/>
-              </a:ext>
-            </a:extLst>
-          </a:blip>
-          <a:stretch>
-            <a:fillRect/>
-          </a:stretch>
-        </p:blipFill>
-        <p:spPr>
-          <a:xfrm>
-            <a:off x="10410230" y="3701693"/>
-            <a:ext cx="1346616" cy="1416920"/>
-          </a:xfrm>
-          <a:prstGeom prst="rect">
-            <a:avLst/>
-          </a:prstGeom>
-        </p:spPr>
-      </p:pic>
-      <p:pic>
-        <p:nvPicPr>
-          <p:cNvPr id="6" name="Grafik 3" descr="Ein Bild, das Zeichnung enthält.&#10;&#10;Automatisch generierte Beschreibung">
-            <a:extLst>
-              <a:ext uri="{FF2B5EF4-FFF2-40B4-BE49-F238E27FC236}">
-                <a16:creationId xmlns:a16="http://schemas.microsoft.com/office/drawing/2014/main" id="{E96EE0FA-89E6-41DD-9626-00BC6AB2763A}"/>
-              </a:ext>
-            </a:extLst>
-          </p:cNvPr>
-          <p:cNvPicPr>
-            <a:picLocks noChangeAspect="1"/>
-          </p:cNvPicPr>
-          <p:nvPr/>
-        </p:nvPicPr>
-        <p:blipFill>
-          <a:blip r:embed="rId4">
-            <a:extLst>
-              <a:ext uri="{28A0092B-C50C-407E-A947-70E740481C1C}">
-                <a14:useLocalDpi xmlns:a14="http://schemas.microsoft.com/office/drawing/2010/main" val="0"/>
-              </a:ext>
-            </a:extLst>
-          </a:blip>
-          <a:stretch>
-            <a:fillRect/>
-          </a:stretch>
-        </p:blipFill>
-        <p:spPr>
-          <a:xfrm>
-            <a:off x="494937" y="3655229"/>
-            <a:ext cx="1346616" cy="1416920"/>
-          </a:xfrm>
-          <a:prstGeom prst="rect">
-            <a:avLst/>
-          </a:prstGeom>
-        </p:spPr>
-      </p:pic>
-      <p:sp>
-        <p:nvSpPr>
-          <p:cNvPr id="7" name="Rectangle 6">
-            <a:extLst>
-              <a:ext uri="{FF2B5EF4-FFF2-40B4-BE49-F238E27FC236}">
-                <a16:creationId xmlns:a16="http://schemas.microsoft.com/office/drawing/2014/main" id="{E79A8B2E-6045-4050-A0BF-52B4B8CA91EA}"/>
-              </a:ext>
-            </a:extLst>
-          </p:cNvPr>
-          <p:cNvSpPr/>
-          <p:nvPr/>
-        </p:nvSpPr>
-        <p:spPr>
-          <a:xfrm>
-            <a:off x="5205528" y="3820919"/>
-            <a:ext cx="1635511" cy="1338145"/>
-          </a:xfrm>
-          <a:prstGeom prst="rect">
-            <a:avLst/>
-          </a:prstGeom>
-          <a:solidFill>
-            <a:srgbClr val="00A7CE"/>
-          </a:solidFill>
-        </p:spPr>
-        <p:style>
-          <a:lnRef idx="2">
-            <a:schemeClr val="accent1">
-              <a:shade val="50000"/>
-            </a:schemeClr>
-          </a:lnRef>
-          <a:fillRef idx="1">
-            <a:schemeClr val="accent1"/>
-          </a:fillRef>
-          <a:effectRef idx="0">
-            <a:schemeClr val="accent1"/>
-          </a:effectRef>
-          <a:fontRef idx="minor">
-            <a:schemeClr val="lt1"/>
-          </a:fontRef>
-        </p:style>
-        <p:txBody>
-          <a:bodyPr rtlCol="0" anchor="ctr"/>
-          <a:lstStyle/>
-          <a:p>
-            <a:pPr algn="ctr"/>
-            <a:r>
-              <a:rPr lang="en-US" sz="1600" dirty="0">
-                <a:latin typeface="Roboto"/>
-                <a:cs typeface="Calibri"/>
-              </a:rPr>
-              <a:t>ft. Middleware</a:t>
-            </a:r>
-            <a:endParaRPr lang="en-US" sz="1600">
-              <a:latin typeface="Roboto"/>
-            </a:endParaRPr>
-          </a:p>
-        </p:txBody>
-      </p:sp>
-      <p:pic>
-        <p:nvPicPr>
-          <p:cNvPr id="9" name="Grafik 12" descr="Ein Bild, das Zeichnung, Schild enthält.&#10;&#10;Automatisch generierte Beschreibung">
-            <a:extLst>
-              <a:ext uri="{FF2B5EF4-FFF2-40B4-BE49-F238E27FC236}">
-                <a16:creationId xmlns:a16="http://schemas.microsoft.com/office/drawing/2014/main" id="{A87FD192-152D-974F-8994-042665E8389D}"/>
-              </a:ext>
-            </a:extLst>
-          </p:cNvPr>
-          <p:cNvPicPr>
-            <a:picLocks noChangeAspect="1"/>
-          </p:cNvPicPr>
-          <p:nvPr/>
-        </p:nvPicPr>
-        <p:blipFill>
-          <a:blip r:embed="rId5">
+          <a:blip r:embed="rId3">
             <a:extLst>
               <a:ext uri="{28A0092B-C50C-407E-A947-70E740481C1C}">
                 <a14:useLocalDpi xmlns:a14="http://schemas.microsoft.com/office/drawing/2010/main" val="0"/>
@@ -18697,7 +18391,7 @@
           <p:nvPr/>
         </p:nvPicPr>
         <p:blipFill rotWithShape="1">
-          <a:blip r:embed="rId6">
+          <a:blip r:embed="rId4">
             <a:alphaModFix amt="15000"/>
             <a:extLst>
               <a:ext uri="{28A0092B-C50C-407E-A947-70E740481C1C}">
@@ -18712,6 +18406,42 @@
           <a:xfrm>
             <a:off x="10313964" y="5093305"/>
             <a:ext cx="1886400" cy="1801618"/>
+          </a:xfrm>
+          <a:prstGeom prst="rect">
+            <a:avLst/>
+          </a:prstGeom>
+        </p:spPr>
+      </p:pic>
+      <p:pic>
+        <p:nvPicPr>
+          <p:cNvPr id="18" name="Picture 17" descr="A picture containing graphical user interface&#10;&#10;Description automatically generated">
+            <a:extLst>
+              <a:ext uri="{FF2B5EF4-FFF2-40B4-BE49-F238E27FC236}">
+                <a16:creationId xmlns:a16="http://schemas.microsoft.com/office/drawing/2014/main" id="{6706C5E5-17F2-F644-A721-D71F01DEFA2C}"/>
+              </a:ext>
+            </a:extLst>
+          </p:cNvPr>
+          <p:cNvPicPr>
+            <a:picLocks noChangeAspect="1"/>
+          </p:cNvPicPr>
+          <p:nvPr/>
+        </p:nvPicPr>
+        <p:blipFill>
+          <a:blip r:embed="rId5">
+            <a:extLst>
+              <a:ext uri="{28A0092B-C50C-407E-A947-70E740481C1C}">
+                <a14:useLocalDpi xmlns:a14="http://schemas.microsoft.com/office/drawing/2010/main" val="0"/>
+              </a:ext>
+            </a:extLst>
+          </a:blip>
+          <a:stretch>
+            <a:fillRect/>
+          </a:stretch>
+        </p:blipFill>
+        <p:spPr>
+          <a:xfrm>
+            <a:off x="2844800" y="1733550"/>
+            <a:ext cx="6502400" cy="3390900"/>
           </a:xfrm>
           <a:prstGeom prst="rect">
             <a:avLst/>
@@ -18780,151 +18510,6 @@
       </p:sp>
       <p:pic>
         <p:nvPicPr>
-          <p:cNvPr id="5" name="Content Placeholder 4">
-            <a:extLst>
-              <a:ext uri="{FF2B5EF4-FFF2-40B4-BE49-F238E27FC236}">
-                <a16:creationId xmlns:a16="http://schemas.microsoft.com/office/drawing/2014/main" id="{AAD9D593-4D41-3A4A-9513-9042BB107570}"/>
-              </a:ext>
-            </a:extLst>
-          </p:cNvPr>
-          <p:cNvPicPr>
-            <a:picLocks noGrp="1" noChangeAspect="1"/>
-          </p:cNvPicPr>
-          <p:nvPr>
-            <p:ph idx="1"/>
-          </p:nvPr>
-        </p:nvPicPr>
-        <p:blipFill>
-          <a:blip r:embed="rId3"/>
-          <a:stretch/>
-        </p:blipFill>
-        <p:spPr>
-          <a:xfrm>
-            <a:off x="577850" y="1213543"/>
-            <a:ext cx="11080750" cy="4981777"/>
-          </a:xfrm>
-        </p:spPr>
-      </p:pic>
-      <p:sp>
-        <p:nvSpPr>
-          <p:cNvPr id="3" name="Rechteck 2">
-            <a:extLst>
-              <a:ext uri="{FF2B5EF4-FFF2-40B4-BE49-F238E27FC236}">
-                <a16:creationId xmlns:a16="http://schemas.microsoft.com/office/drawing/2014/main" id="{BAE66F9C-C014-49A8-8182-FA47E479BE09}"/>
-              </a:ext>
-            </a:extLst>
-          </p:cNvPr>
-          <p:cNvSpPr/>
-          <p:nvPr/>
-        </p:nvSpPr>
-        <p:spPr>
-          <a:xfrm>
-            <a:off x="5352098" y="3846195"/>
-            <a:ext cx="1340167" cy="1102995"/>
-          </a:xfrm>
-          <a:prstGeom prst="rect">
-            <a:avLst/>
-          </a:prstGeom>
-          <a:solidFill>
-            <a:srgbClr val="00A7CE">
-              <a:alpha val="60000"/>
-            </a:srgbClr>
-          </a:solidFill>
-          <a:ln>
-            <a:noFill/>
-          </a:ln>
-        </p:spPr>
-        <p:style>
-          <a:lnRef idx="2">
-            <a:schemeClr val="accent1">
-              <a:shade val="50000"/>
-            </a:schemeClr>
-          </a:lnRef>
-          <a:fillRef idx="1">
-            <a:schemeClr val="accent1"/>
-          </a:fillRef>
-          <a:effectRef idx="0">
-            <a:schemeClr val="accent1"/>
-          </a:effectRef>
-          <a:fontRef idx="minor">
-            <a:schemeClr val="lt1"/>
-          </a:fontRef>
-        </p:style>
-        <p:txBody>
-          <a:bodyPr rtlCol="0" anchor="ctr"/>
-          <a:lstStyle/>
-          <a:p>
-            <a:pPr algn="ctr"/>
-            <a:r>
-              <a:rPr lang="de-AT" sz="1400" dirty="0">
-                <a:latin typeface="Roboto" panose="02000000000000000000" pitchFamily="2" charset="0"/>
-                <a:ea typeface="Roboto" panose="02000000000000000000" pitchFamily="2" charset="0"/>
-              </a:rPr>
-              <a:t>ft.Middleware</a:t>
-            </a:r>
-          </a:p>
-        </p:txBody>
-      </p:sp>
-      <p:sp>
-        <p:nvSpPr>
-          <p:cNvPr id="4" name="Rectangle 3">
-            <a:extLst>
-              <a:ext uri="{FF2B5EF4-FFF2-40B4-BE49-F238E27FC236}">
-                <a16:creationId xmlns:a16="http://schemas.microsoft.com/office/drawing/2014/main" id="{D13F006E-D64B-42CA-8276-F3601735478A}"/>
-              </a:ext>
-            </a:extLst>
-          </p:cNvPr>
-          <p:cNvSpPr/>
-          <p:nvPr/>
-        </p:nvSpPr>
-        <p:spPr>
-          <a:xfrm>
-            <a:off x="5185781" y="3858090"/>
-            <a:ext cx="1738892" cy="1386235"/>
-          </a:xfrm>
-          <a:prstGeom prst="rect">
-            <a:avLst/>
-          </a:prstGeom>
-          <a:solidFill>
-            <a:srgbClr val="00A7CE"/>
-          </a:solidFill>
-        </p:spPr>
-        <p:style>
-          <a:lnRef idx="2">
-            <a:schemeClr val="accent1">
-              <a:shade val="50000"/>
-            </a:schemeClr>
-          </a:lnRef>
-          <a:fillRef idx="1">
-            <a:schemeClr val="accent1"/>
-          </a:fillRef>
-          <a:effectRef idx="0">
-            <a:schemeClr val="accent1"/>
-          </a:effectRef>
-          <a:fontRef idx="minor">
-            <a:schemeClr val="lt1"/>
-          </a:fontRef>
-        </p:style>
-        <p:txBody>
-          <a:bodyPr rtlCol="0" anchor="ctr"/>
-          <a:lstStyle/>
-          <a:p>
-            <a:pPr algn="ctr"/>
-            <a:r>
-              <a:rPr lang="en-US" sz="1600" dirty="0">
-                <a:latin typeface="Roboto"/>
-                <a:cs typeface="Calibri"/>
-              </a:rPr>
-              <a:t>ft. Middleware</a:t>
-            </a:r>
-            <a:endParaRPr lang="en-US" sz="1600" dirty="0">
-              <a:latin typeface="Roboto"/>
-            </a:endParaRPr>
-          </a:p>
-        </p:txBody>
-      </p:sp>
-      <p:pic>
-        <p:nvPicPr>
           <p:cNvPr id="7" name="Grafik 12" descr="Ein Bild, das Zeichnung, Schild enthält.&#10;&#10;Automatisch generierte Beschreibung">
             <a:extLst>
               <a:ext uri="{FF2B5EF4-FFF2-40B4-BE49-F238E27FC236}">
@@ -18938,7 +18523,7 @@
           <p:nvPr/>
         </p:nvPicPr>
         <p:blipFill>
-          <a:blip r:embed="rId4">
+          <a:blip r:embed="rId3">
             <a:extLst>
               <a:ext uri="{28A0092B-C50C-407E-A947-70E740481C1C}">
                 <a14:useLocalDpi xmlns:a14="http://schemas.microsoft.com/office/drawing/2010/main" val="0"/>
@@ -18974,7 +18559,7 @@
           <p:nvPr/>
         </p:nvPicPr>
         <p:blipFill rotWithShape="1">
-          <a:blip r:embed="rId5">
+          <a:blip r:embed="rId4">
             <a:alphaModFix amt="15000"/>
             <a:extLst>
               <a:ext uri="{28A0092B-C50C-407E-A947-70E740481C1C}">
@@ -18989,6 +18574,42 @@
           <a:xfrm>
             <a:off x="10313964" y="5093305"/>
             <a:ext cx="1886400" cy="1801618"/>
+          </a:xfrm>
+          <a:prstGeom prst="rect">
+            <a:avLst/>
+          </a:prstGeom>
+        </p:spPr>
+      </p:pic>
+      <p:pic>
+        <p:nvPicPr>
+          <p:cNvPr id="17" name="Picture 16" descr="Graphical user interface, diagram&#10;&#10;Description automatically generated">
+            <a:extLst>
+              <a:ext uri="{FF2B5EF4-FFF2-40B4-BE49-F238E27FC236}">
+                <a16:creationId xmlns:a16="http://schemas.microsoft.com/office/drawing/2014/main" id="{D5E00B30-BEB9-AB4E-90F0-09562562B500}"/>
+              </a:ext>
+            </a:extLst>
+          </p:cNvPr>
+          <p:cNvPicPr>
+            <a:picLocks noChangeAspect="1"/>
+          </p:cNvPicPr>
+          <p:nvPr/>
+        </p:nvPicPr>
+        <p:blipFill>
+          <a:blip r:embed="rId5">
+            <a:extLst>
+              <a:ext uri="{28A0092B-C50C-407E-A947-70E740481C1C}">
+                <a14:useLocalDpi xmlns:a14="http://schemas.microsoft.com/office/drawing/2010/main" val="0"/>
+              </a:ext>
+            </a:extLst>
+          </a:blip>
+          <a:stretch>
+            <a:fillRect/>
+          </a:stretch>
+        </p:blipFill>
+        <p:spPr>
+          <a:xfrm>
+            <a:off x="745630" y="65753"/>
+            <a:ext cx="10700740" cy="6726494"/>
           </a:xfrm>
           <a:prstGeom prst="rect">
             <a:avLst/>
@@ -19894,21 +19515,6 @@
 </file>
 
 <file path=customXml/item1.xml><?xml version="1.0" encoding="utf-8"?>
-<?mso-contentType ?>
-<FormTemplates xmlns="http://schemas.microsoft.com/sharepoint/v3/contenttype/forms">
-  <Display>DocumentLibraryForm</Display>
-  <Edit>DocumentLibraryForm</Edit>
-  <New>DocumentLibraryForm</New>
-</FormTemplates>
-</file>
-
-<file path=customXml/item2.xml><?xml version="1.0" encoding="utf-8"?>
-<p:properties xmlns:p="http://schemas.microsoft.com/office/2006/metadata/properties" xmlns:xsi="http://www.w3.org/2001/XMLSchema-instance" xmlns:pc="http://schemas.microsoft.com/office/infopath/2007/PartnerControls">
-  <documentManagement/>
-</p:properties>
-</file>
-
-<file path=customXml/item3.xml><?xml version="1.0" encoding="utf-8"?>
 <ct:contentTypeSchema xmlns:ct="http://schemas.microsoft.com/office/2006/metadata/contentType" xmlns:ma="http://schemas.microsoft.com/office/2006/metadata/properties/metaAttributes" ct:_="" ma:_="" ma:contentTypeName="Document" ma:contentTypeID="0x01010003A087929988544A956B845A242A1874" ma:contentTypeVersion="9" ma:contentTypeDescription="Create a new document." ma:contentTypeScope="" ma:versionID="a063f29419c0dc871a57124984a5c02e">
   <xsd:schema xmlns:xsd="http://www.w3.org/2001/XMLSchema" xmlns:xs="http://www.w3.org/2001/XMLSchema" xmlns:p="http://schemas.microsoft.com/office/2006/metadata/properties" xmlns:ns2="c3142773-ea53-476f-8961-6b85122cde25" targetNamespace="http://schemas.microsoft.com/office/2006/metadata/properties" ma:root="true" ma:fieldsID="a552620fe450120d7f85de4f65b137a4" ns2:_="">
     <xsd:import namespace="c3142773-ea53-476f-8961-6b85122cde25"/>
@@ -20086,24 +19692,22 @@
 </ct:contentTypeSchema>
 </file>
 
-<file path=customXml/itemProps1.xml><?xml version="1.0" encoding="utf-8"?>
-<ds:datastoreItem xmlns:ds="http://schemas.openxmlformats.org/officeDocument/2006/customXml" ds:itemID="{3F407387-4BEA-45E7-A546-EAF24BCEADF4}">
-  <ds:schemaRefs>
-    <ds:schemaRef ds:uri="http://schemas.microsoft.com/sharepoint/v3/contenttype/forms"/>
-  </ds:schemaRefs>
-</ds:datastoreItem>
+<file path=customXml/item2.xml><?xml version="1.0" encoding="utf-8"?>
+<p:properties xmlns:p="http://schemas.microsoft.com/office/2006/metadata/properties" xmlns:xsi="http://www.w3.org/2001/XMLSchema-instance" xmlns:pc="http://schemas.microsoft.com/office/infopath/2007/PartnerControls">
+  <documentManagement/>
+</p:properties>
 </file>
 
-<file path=customXml/itemProps2.xml><?xml version="1.0" encoding="utf-8"?>
-<ds:datastoreItem xmlns:ds="http://schemas.openxmlformats.org/officeDocument/2006/customXml" ds:itemID="{A770BCC9-0480-4A5F-A5A5-05648EB42497}">
-  <ds:schemaRefs>
-    <ds:schemaRef ds:uri="http://schemas.microsoft.com/office/2006/metadata/properties"/>
-    <ds:schemaRef ds:uri="http://schemas.microsoft.com/office/infopath/2007/PartnerControls"/>
-  </ds:schemaRefs>
-</ds:datastoreItem>
+<file path=customXml/item3.xml><?xml version="1.0" encoding="utf-8"?>
+<?mso-contentType ?>
+<FormTemplates xmlns="http://schemas.microsoft.com/sharepoint/v3/contenttype/forms">
+  <Display>DocumentLibraryForm</Display>
+  <Edit>DocumentLibraryForm</Edit>
+  <New>DocumentLibraryForm</New>
+</FormTemplates>
 </file>
 
-<file path=customXml/itemProps3.xml><?xml version="1.0" encoding="utf-8"?>
+<file path=customXml/itemProps1.xml><?xml version="1.0" encoding="utf-8"?>
 <ds:datastoreItem xmlns:ds="http://schemas.openxmlformats.org/officeDocument/2006/customXml" ds:itemID="{4A4E1077-0687-4F67-BE9D-7A4D4029BB02}">
   <ds:schemaRefs>
     <ds:schemaRef ds:uri="http://schemas.microsoft.com/office/2006/metadata/contentType"/>
@@ -20119,4 +19723,21 @@
     <ds:schemaRef ds:uri="http://schemas.microsoft.com/internal/obd"/>
   </ds:schemaRefs>
 </ds:datastoreItem>
+</file>
+
+<file path=customXml/itemProps2.xml><?xml version="1.0" encoding="utf-8"?>
+<ds:datastoreItem xmlns:ds="http://schemas.openxmlformats.org/officeDocument/2006/customXml" ds:itemID="{A770BCC9-0480-4A5F-A5A5-05648EB42497}">
+  <ds:schemaRefs>
+    <ds:schemaRef ds:uri="http://schemas.microsoft.com/office/2006/metadata/properties"/>
+    <ds:schemaRef ds:uri="http://schemas.microsoft.com/office/infopath/2007/PartnerControls"/>
+  </ds:schemaRefs>
+</ds:datastoreItem>
+</file>
+
+<file path=customXml/itemProps3.xml><?xml version="1.0" encoding="utf-8"?>
+<ds:datastoreItem xmlns:ds="http://schemas.openxmlformats.org/officeDocument/2006/customXml" ds:itemID="{3F407387-4BEA-45E7-A546-EAF24BCEADF4}">
+  <ds:schemaRefs>
+    <ds:schemaRef ds:uri="http://schemas.microsoft.com/sharepoint/v3/contenttype/forms"/>
+  </ds:schemaRefs>
+</ds:datastoreItem>
 </file>
</xml_diff>

<commit_message>
improve pos-creator lead presentation
</commit_message>
<xml_diff>
--- a/for-poscreators/presentation/media/lead-presentation-creator-de.pptx
+++ b/for-poscreators/presentation/media/lead-presentation-creator-de.pptx
@@ -2318,7 +2318,7 @@
         <a:p>
           <a:r>
             <a:rPr lang="de-DE" dirty="0"/>
-            <a:t>Einladungs- E-Mail an die Händler</a:t>
+            <a:t>Einladungs- E-Mail an die Händler (über POS System)</a:t>
           </a:r>
         </a:p>
       </dgm:t>
@@ -2908,7 +2908,10 @@
         <a:bodyPr/>
         <a:lstStyle/>
         <a:p>
-          <a:endParaRPr lang="de-DE" dirty="0"/>
+          <a:r>
+            <a:rPr lang="de-DE" dirty="0"/>
+            <a:t>Kooperationsvertrag unterzeichnen</a:t>
+          </a:r>
         </a:p>
       </dgm:t>
     </dgm:pt>
@@ -2949,7 +2952,7 @@
         <a:p>
           <a:r>
             <a:rPr lang="de-DE" dirty="0"/>
-            <a:t>Vertrag unterzeichnen</a:t>
+            <a:t>POS System erfassen</a:t>
           </a:r>
         </a:p>
       </dgm:t>
@@ -3396,27 +3399,12 @@
         <a:fontRef idx="minor"/>
       </dsp:style>
       <dsp:txBody>
-        <a:bodyPr spcFirstLastPara="0" vert="horz" wrap="square" lIns="24765" tIns="24765" rIns="24765" bIns="24765" numCol="1" spcCol="1270" anchor="t" anchorCtr="0">
+        <a:bodyPr spcFirstLastPara="0" vert="horz" wrap="square" lIns="20955" tIns="20955" rIns="20955" bIns="20955" numCol="1" spcCol="1270" anchor="t" anchorCtr="0">
           <a:noAutofit/>
         </a:bodyPr>
         <a:lstStyle/>
         <a:p>
-          <a:pPr marL="114300" lvl="1" indent="-114300" algn="l" defTabSz="577850">
-            <a:lnSpc>
-              <a:spcPct val="90000"/>
-            </a:lnSpc>
-            <a:spcBef>
-              <a:spcPct val="0"/>
-            </a:spcBef>
-            <a:spcAft>
-              <a:spcPct val="15000"/>
-            </a:spcAft>
-            <a:buChar char="•"/>
-          </a:pPr>
-          <a:endParaRPr lang="de-DE" sz="1300" kern="1200" dirty="0"/>
-        </a:p>
-        <a:p>
-          <a:pPr marL="114300" lvl="1" indent="-114300" algn="l" defTabSz="577850">
+          <a:pPr marL="57150" lvl="1" indent="-57150" algn="l" defTabSz="488950">
             <a:lnSpc>
               <a:spcPct val="90000"/>
             </a:lnSpc>
@@ -3429,12 +3417,12 @@
             <a:buChar char="•"/>
           </a:pPr>
           <a:r>
-            <a:rPr lang="de-DE" sz="1300" kern="1200" dirty="0"/>
-            <a:t>Vertrag unterzeichnen</a:t>
+            <a:rPr lang="de-DE" sz="1100" kern="1200" dirty="0"/>
+            <a:t>Kooperationsvertrag unterzeichnen</a:t>
           </a:r>
         </a:p>
         <a:p>
-          <a:pPr marL="114300" lvl="1" indent="-114300" algn="l" defTabSz="577850">
+          <a:pPr marL="57150" lvl="1" indent="-57150" algn="l" defTabSz="488950">
             <a:lnSpc>
               <a:spcPct val="90000"/>
             </a:lnSpc>
@@ -3447,8 +3435,26 @@
             <a:buChar char="•"/>
           </a:pPr>
           <a:r>
-            <a:rPr lang="de-DE" sz="1300" kern="1200" dirty="0"/>
-            <a:t>Einladungs- E-Mail an die Händler</a:t>
+            <a:rPr lang="de-DE" sz="1100" kern="1200" dirty="0"/>
+            <a:t>POS System erfassen</a:t>
+          </a:r>
+        </a:p>
+        <a:p>
+          <a:pPr marL="57150" lvl="1" indent="-57150" algn="l" defTabSz="488950">
+            <a:lnSpc>
+              <a:spcPct val="90000"/>
+            </a:lnSpc>
+            <a:spcBef>
+              <a:spcPct val="0"/>
+            </a:spcBef>
+            <a:spcAft>
+              <a:spcPct val="15000"/>
+            </a:spcAft>
+            <a:buChar char="•"/>
+          </a:pPr>
+          <a:r>
+            <a:rPr lang="de-DE" sz="1100" kern="1200" dirty="0"/>
+            <a:t>Einladungs- E-Mail an die Händler (über POS System)</a:t>
           </a:r>
         </a:p>
       </dsp:txBody>
@@ -3620,12 +3626,12 @@
         <a:fontRef idx="minor"/>
       </dsp:style>
       <dsp:txBody>
-        <a:bodyPr spcFirstLastPara="0" vert="horz" wrap="square" lIns="24765" tIns="24765" rIns="24765" bIns="24765" numCol="1" spcCol="1270" anchor="t" anchorCtr="0">
+        <a:bodyPr spcFirstLastPara="0" vert="horz" wrap="square" lIns="20955" tIns="20955" rIns="20955" bIns="20955" numCol="1" spcCol="1270" anchor="t" anchorCtr="0">
           <a:noAutofit/>
         </a:bodyPr>
         <a:lstStyle/>
         <a:p>
-          <a:pPr marL="114300" lvl="1" indent="-114300" algn="l" defTabSz="577850">
+          <a:pPr marL="57150" lvl="1" indent="-57150" algn="l" defTabSz="488950">
             <a:lnSpc>
               <a:spcPct val="90000"/>
             </a:lnSpc>
@@ -3638,12 +3644,12 @@
             <a:buChar char="•"/>
           </a:pPr>
           <a:r>
-            <a:rPr lang="de-DE" sz="1300" kern="1200" dirty="0"/>
+            <a:rPr lang="de-DE" sz="1100" kern="1200" dirty="0"/>
             <a:t>E-Mail Link</a:t>
           </a:r>
         </a:p>
         <a:p>
-          <a:pPr marL="114300" lvl="1" indent="-114300" algn="l" defTabSz="577850">
+          <a:pPr marL="57150" lvl="1" indent="-57150" algn="l" defTabSz="488950">
             <a:lnSpc>
               <a:spcPct val="90000"/>
             </a:lnSpc>
@@ -3656,12 +3662,12 @@
             <a:buChar char="•"/>
           </a:pPr>
           <a:r>
-            <a:rPr lang="de-DE" sz="1300" kern="1200" dirty="0"/>
+            <a:rPr lang="de-DE" sz="1100" kern="1200" dirty="0"/>
             <a:t>Passwort setzen</a:t>
           </a:r>
         </a:p>
         <a:p>
-          <a:pPr marL="114300" lvl="1" indent="-114300" algn="l" defTabSz="577850">
+          <a:pPr marL="57150" lvl="1" indent="-57150" algn="l" defTabSz="488950">
             <a:lnSpc>
               <a:spcPct val="90000"/>
             </a:lnSpc>
@@ -3674,7 +3680,7 @@
             <a:buChar char="•"/>
           </a:pPr>
           <a:r>
-            <a:rPr lang="de-DE" sz="1300" kern="1200" dirty="0"/>
+            <a:rPr lang="de-DE" sz="1100" kern="1200" dirty="0"/>
             <a:t>Vertrag unterzeichnen</a:t>
           </a:r>
         </a:p>
@@ -3847,12 +3853,12 @@
         <a:fontRef idx="minor"/>
       </dsp:style>
       <dsp:txBody>
-        <a:bodyPr spcFirstLastPara="0" vert="horz" wrap="square" lIns="24765" tIns="24765" rIns="24765" bIns="24765" numCol="1" spcCol="1270" anchor="t" anchorCtr="0">
+        <a:bodyPr spcFirstLastPara="0" vert="horz" wrap="square" lIns="20955" tIns="20955" rIns="20955" bIns="20955" numCol="1" spcCol="1270" anchor="t" anchorCtr="0">
           <a:noAutofit/>
         </a:bodyPr>
         <a:lstStyle/>
         <a:p>
-          <a:pPr marL="114300" lvl="1" indent="-114300" algn="l" defTabSz="577850">
+          <a:pPr marL="57150" lvl="1" indent="-57150" algn="l" defTabSz="488950">
             <a:lnSpc>
               <a:spcPct val="90000"/>
             </a:lnSpc>
@@ -3865,12 +3871,12 @@
             <a:buChar char="•"/>
           </a:pPr>
           <a:r>
-            <a:rPr lang="de-DE" sz="1300" kern="1200" dirty="0"/>
+            <a:rPr lang="de-DE" sz="1100" kern="1200" dirty="0"/>
             <a:t>csv-file Erstellen (Masseneinladung der Betreiber)</a:t>
           </a:r>
         </a:p>
         <a:p>
-          <a:pPr marL="114300" lvl="1" indent="-114300" algn="l" defTabSz="577850">
+          <a:pPr marL="57150" lvl="1" indent="-57150" algn="l" defTabSz="488950">
             <a:lnSpc>
               <a:spcPct val="90000"/>
             </a:lnSpc>
@@ -3883,7 +3889,7 @@
             <a:buChar char="•"/>
           </a:pPr>
           <a:r>
-            <a:rPr lang="de-DE" sz="1300" kern="1200" dirty="0"/>
+            <a:rPr lang="de-DE" sz="1100" kern="1200" dirty="0"/>
             <a:t>Einladungs- E-Mail an die Kassenbetreiber</a:t>
           </a:r>
         </a:p>
@@ -4056,12 +4062,12 @@
         <a:fontRef idx="minor"/>
       </dsp:style>
       <dsp:txBody>
-        <a:bodyPr spcFirstLastPara="0" vert="horz" wrap="square" lIns="24765" tIns="24765" rIns="24765" bIns="24765" numCol="1" spcCol="1270" anchor="t" anchorCtr="0">
+        <a:bodyPr spcFirstLastPara="0" vert="horz" wrap="square" lIns="20955" tIns="20955" rIns="20955" bIns="20955" numCol="1" spcCol="1270" anchor="t" anchorCtr="0">
           <a:noAutofit/>
         </a:bodyPr>
         <a:lstStyle/>
         <a:p>
-          <a:pPr marL="114300" lvl="1" indent="-114300" algn="l" defTabSz="577850">
+          <a:pPr marL="57150" lvl="1" indent="-57150" algn="l" defTabSz="488950">
             <a:lnSpc>
               <a:spcPct val="90000"/>
             </a:lnSpc>
@@ -4074,12 +4080,12 @@
             <a:buChar char="•"/>
           </a:pPr>
           <a:r>
-            <a:rPr lang="de-DE" sz="1300" kern="1200" dirty="0"/>
+            <a:rPr lang="de-DE" sz="1100" kern="1200" dirty="0"/>
             <a:t>E-Mail Link</a:t>
           </a:r>
         </a:p>
         <a:p>
-          <a:pPr marL="114300" lvl="1" indent="-114300" algn="l" defTabSz="577850">
+          <a:pPr marL="57150" lvl="1" indent="-57150" algn="l" defTabSz="488950">
             <a:lnSpc>
               <a:spcPct val="90000"/>
             </a:lnSpc>
@@ -4092,12 +4098,12 @@
             <a:buChar char="•"/>
           </a:pPr>
           <a:r>
-            <a:rPr lang="de-DE" sz="1300" kern="1200" dirty="0"/>
+            <a:rPr lang="de-DE" sz="1100" kern="1200" dirty="0"/>
             <a:t>Passwort setzen</a:t>
           </a:r>
         </a:p>
         <a:p>
-          <a:pPr marL="114300" lvl="1" indent="-114300" algn="l" defTabSz="577850">
+          <a:pPr marL="57150" lvl="1" indent="-57150" algn="l" defTabSz="488950">
             <a:lnSpc>
               <a:spcPct val="90000"/>
             </a:lnSpc>
@@ -4110,7 +4116,7 @@
             <a:buChar char="•"/>
           </a:pPr>
           <a:r>
-            <a:rPr lang="de-DE" sz="1300" kern="1200" dirty="0"/>
+            <a:rPr lang="de-DE" sz="1100" kern="1200" dirty="0"/>
             <a:t>Vertrag unterzeichnen</a:t>
           </a:r>
         </a:p>
@@ -4283,12 +4289,12 @@
         <a:fontRef idx="minor"/>
       </dsp:style>
       <dsp:txBody>
-        <a:bodyPr spcFirstLastPara="0" vert="horz" wrap="square" lIns="24765" tIns="24765" rIns="24765" bIns="24765" numCol="1" spcCol="1270" anchor="t" anchorCtr="0">
+        <a:bodyPr spcFirstLastPara="0" vert="horz" wrap="square" lIns="20955" tIns="20955" rIns="20955" bIns="20955" numCol="1" spcCol="1270" anchor="t" anchorCtr="0">
           <a:noAutofit/>
         </a:bodyPr>
         <a:lstStyle/>
         <a:p>
-          <a:pPr marL="114300" lvl="1" indent="-114300" algn="l" defTabSz="577850">
+          <a:pPr marL="57150" lvl="1" indent="-57150" algn="l" defTabSz="488950">
             <a:lnSpc>
               <a:spcPct val="90000"/>
             </a:lnSpc>
@@ -4301,12 +4307,12 @@
             <a:buChar char="•"/>
           </a:pPr>
           <a:r>
-            <a:rPr lang="de-DE" sz="1300" kern="1200" dirty="0"/>
+            <a:rPr lang="de-DE" sz="1100" kern="1200" dirty="0"/>
             <a:t>Zugriffoptionen auf Betreiberkonto</a:t>
           </a:r>
         </a:p>
         <a:p>
-          <a:pPr marL="114300" lvl="1" indent="-114300" algn="l" defTabSz="577850">
+          <a:pPr marL="57150" lvl="1" indent="-57150" algn="l" defTabSz="488950">
             <a:lnSpc>
               <a:spcPct val="90000"/>
             </a:lnSpc>
@@ -4318,7 +4324,7 @@
             </a:spcAft>
             <a:buChar char="•"/>
           </a:pPr>
-          <a:endParaRPr lang="de-DE" sz="1300" kern="1200" dirty="0"/>
+          <a:endParaRPr lang="de-DE" sz="1100" kern="1200" dirty="0"/>
         </a:p>
       </dsp:txBody>
       <dsp:txXfrm>
@@ -6265,7 +6271,7 @@
           <a:p>
             <a:fld id="{E52F4C69-7549-4A71-BB0C-341D25F594E8}" type="datetime1">
               <a:rPr lang="de-AT" smtClean="0"/>
-              <a:t>19.10.20</a:t>
+              <a:t>20.10.20</a:t>
             </a:fld>
             <a:endParaRPr lang="de-AT" dirty="0"/>
           </a:p>
@@ -6667,7 +6673,7 @@
             </a:pPr>
             <a:r>
               <a:rPr lang="de-DE" noProof="0" dirty="0"/>
-              <a:t>Das  POS System sammelt die Charge- und PayItems für den Request. </a:t>
+              <a:t>Die Eingabestation des POS System sammelt die Charge- und PayItems für den Request. </a:t>
             </a:r>
           </a:p>
           <a:p>
@@ -6676,7 +6682,7 @@
             </a:pPr>
             <a:r>
               <a:rPr lang="de-DE" noProof="0" dirty="0"/>
-              <a:t>Das  POS System sollte die Daten lokal persistieren. Das Persistieren der Daten ist wichtig, weil die Request-Daten nicht von der ft.Middleware zurückgesendet werden. Zudem ist die lokale Archivierung essentiell für den Fall, dass die fiskaltrust Archivierung nicht verfügbar ist.</a:t>
+              <a:t>Der POS System Server sollte die Daten lokal persistieren. Das Persistieren der Daten ist wichtig, weil die Request-Daten nicht von der ft.Middleware zurückgesendet werden. Zudem ist die lokale Archivierung essentiell für den Fall, dass die fiskaltrust Archivierung nicht verfügbar ist.</a:t>
             </a:r>
           </a:p>
           <a:p>
@@ -6685,7 +6691,7 @@
             </a:pPr>
             <a:r>
               <a:rPr lang="de-DE" noProof="0" dirty="0"/>
-              <a:t>Das  POS System baut den Request auf und sendet die Daten über die </a:t>
+              <a:t>Der Server des POS System baut den Request auf und sendet die Daten über die </a:t>
             </a:r>
             <a:r>
               <a:rPr lang="de-DE" noProof="0" dirty="0" err="1"/>
@@ -6702,7 +6708,7 @@
             </a:pPr>
             <a:r>
               <a:rPr lang="de-DE" noProof="0" dirty="0"/>
-              <a:t>Das  POS System erhält den Response und prozessiert die darin enthaltenen Daten, die wichtig für den Belegdruck sind.</a:t>
+              <a:t>Der Server des POS System erhält den Response und prozessiert die darin enthaltenen Daten, die wichtig für den Belegdruck sind.</a:t>
             </a:r>
           </a:p>
           <a:p>
@@ -6711,7 +6717,7 @@
             </a:pPr>
             <a:r>
               <a:rPr lang="de-DE" noProof="0" dirty="0"/>
-              <a:t>Die erhaltenen Daten werden lokal vom  POS System persistiert (siehe dazu auch Pkt. 2)</a:t>
+              <a:t>Die erhaltenen Daten werden lokal vom Server des POS System persistiert (siehe dazu auch Pkt. 2)</a:t>
             </a:r>
           </a:p>
           <a:p>
@@ -6720,7 +6726,7 @@
             </a:pPr>
             <a:r>
               <a:rPr lang="de-DE" noProof="0" dirty="0"/>
-              <a:t>Der Beleg wird erstellt und gedruckt (er enthält die Daten aus dem Signatur-Block des Response)</a:t>
+              <a:t>Der Beleg wird in der Eingabestation erstellt und gedruckt (er enthält die Daten aus dem Signatur-Block des Response)</a:t>
             </a:r>
           </a:p>
         </p:txBody>
@@ -6807,7 +6813,7 @@
           <a:p>
             <a:r>
               <a:rPr lang="de-DE" noProof="0" dirty="0"/>
-              <a:t>Sonderbelege führen Funktionalität aus. Z.B. Initialisierung der TSE, Tagesabschuss, Monatsabschluss, etc.</a:t>
+              <a:t>Sonderbelege führen Funktionalität aus. Z.B. Initialisierung der TSE, Tagesabschuss, Monatsabschluss, Nullbeleg, etc.</a:t>
             </a:r>
           </a:p>
           <a:p>
@@ -6819,7 +6825,7 @@
             </a:pPr>
             <a:r>
               <a:rPr lang="de-DE" noProof="0" dirty="0"/>
-              <a:t>Das  POS System bereitet den Sonderbeleg vor (je nach Funktionalität die ausgeführt werden soll)</a:t>
+              <a:t>Die Eingabestation des POS System triggert die Funktionalität die ausgeführt werden soll</a:t>
             </a:r>
           </a:p>
           <a:p>
@@ -6828,7 +6834,7 @@
             </a:pPr>
             <a:r>
               <a:rPr lang="de-DE" noProof="0" dirty="0"/>
-              <a:t>Das  POS System persistiert lokal die Daten.</a:t>
+              <a:t>Der Server des POS System persistiert lokal die Daten.</a:t>
             </a:r>
           </a:p>
           <a:p>
@@ -6837,7 +6843,7 @@
             </a:pPr>
             <a:r>
               <a:rPr lang="de-DE" noProof="0" dirty="0"/>
-              <a:t>Das  POS System baut den Request zusammen und sendet die Daten über die </a:t>
+              <a:t>Der Server des POS System baut den Request zusammen (Sonderbeleg - je nach Funktionalität die ausgeführt werden soll) und sendet die Daten über die </a:t>
             </a:r>
             <a:r>
               <a:rPr lang="de-DE" noProof="0" dirty="0" err="1"/>
@@ -6854,7 +6860,7 @@
             </a:pPr>
             <a:r>
               <a:rPr lang="de-DE" noProof="0" dirty="0"/>
-              <a:t>Das  POS System erhält den Response und prozessiert die darin enthaltenen Daten</a:t>
+              <a:t>Der Server des POS System erhält den Response und prozessiert die darin enthaltenen Daten</a:t>
             </a:r>
           </a:p>
           <a:p>
@@ -6863,7 +6869,7 @@
             </a:pPr>
             <a:r>
               <a:rPr lang="de-DE" noProof="0" dirty="0"/>
-              <a:t>Die erhaltenen Daten werden lokal vom  POS-System persistiert</a:t>
+              <a:t>Die erhaltenen Daten werden lokal persistiert</a:t>
             </a:r>
           </a:p>
           <a:p>
@@ -7148,7 +7154,7 @@
           <a:p>
             <a:r>
               <a:rPr lang="de-DE" noProof="0" dirty="0"/>
-              <a:t>Sobald die TSE wahrscheinlich wieder erreichbar ist, muss das  POS System einen Nullbeleg (Sonderbeleg der Funktionalität ausführt) an die Queue senden. Dies ist deshalb wichtig, weil die ft.Middleware nicht selbst versucht herauszufinden, ob die TSE wieder erreichbar ist, um das </a:t>
+              <a:t>Sobald die TSE wahrscheinlich wieder erreichbar ist, muss das POS System einen Nullbeleg (Sonderbeleg der Funktionalität ausführt) an die Queue senden. Dies ist deshalb wichtig, weil die ft.Middleware nicht selbst versucht herauszufinden, ob die TSE wieder erreichbar ist, um das </a:t>
             </a:r>
             <a:r>
               <a:rPr lang="de-DE" sz="1200" b="0" i="0" kern="1200" noProof="0" dirty="0">
@@ -7271,13 +7277,13 @@
           <a:p>
             <a:r>
               <a:rPr lang="de-DE" noProof="0" dirty="0"/>
-              <a:t>In diesem Fall kann die ft.Middleware von dem  POS System nicht erreicht werden:</a:t>
+              <a:t>In diesem Fall kann die Queue von dem POS System nicht erreicht werden:</a:t>
             </a:r>
           </a:p>
           <a:p>
             <a:r>
               <a:rPr lang="de-DE" noProof="0" dirty="0"/>
-              <a:t>4. Die Requests müssen markiert werden um später wieder an die ft.Middleware gesendet zu werden. </a:t>
+              <a:t>4. Die Requests müssen markiert werden um später wieder an die Queue gesendet zu werden. </a:t>
             </a:r>
           </a:p>
           <a:p>
@@ -7370,7 +7376,7 @@
           <a:p>
             <a:r>
               <a:rPr lang="de-DE" noProof="0" dirty="0"/>
-              <a:t>Zum späteren Zeitpunkt, wenn die ft.Middleware wieder erreichbar ist, werden vom  POS System im sogenannten „Late Signing Mode“ die zuvor zum Wiederholen markierten Requests an die ft.Middleware gesendet. Jeder Request wird dabei über ein Flag markiert (ftReceiptCase + „failed receipt“ Flag - 0x0000000000010000).</a:t>
+              <a:t>Zum späteren Zeitpunkt, wenn die Queue wieder erreichbar ist, werden vom POS System im sogenannten „Late Signing Mode“ die zuvor zum Wiederholen markierten Requests an die Queue gesendet (Nacherfassung der Belegdaten). Jeder Request wird dabei über ein Flag markiert (ftReceiptCase + „failed receipt“ Flag - 0x0000000000010000).</a:t>
             </a:r>
           </a:p>
           <a:p>
@@ -7379,7 +7385,7 @@
           <a:p>
             <a:r>
               <a:rPr lang="de-DE" noProof="0" dirty="0"/>
-              <a:t>Sobald die ft.Middleware den ersten markierten Request erhält wechselt sie in den „Late Signing Mode“. Es können nun vom  POS System weitere Requests in diesem Modus gesendet werden. Die ft.Middleware antwortet mit den ftState 0x08 was soviel bedeutet, dass sie sich im „Late Signing Mode“ befindet. Um den „Late Signing Mode“ zu verlassen muss das  POS System einen Nullbeleg an die ft.Middleware senden (siehe nächste Folie)</a:t>
+              <a:t>Sobald die Queue den ersten markierten Request erhält wechselt sie in den „Late Signing Mode“. Es können nun vom  POS System weitere Requests in diesem Modus gesendet werden. Die ft.Middleware antwortet mit den ftState 0x08 was soviel bedeutet, dass sie sich im „Late Signing Mode“ befindet. Um den „Late Signing Mode“ zu verlassen muss das  POS System einen Nullbeleg an die ft.Middleware senden (siehe nächste Folie)</a:t>
             </a:r>
           </a:p>
         </p:txBody>
@@ -7466,7 +7472,7 @@
           <a:p>
             <a:r>
               <a:rPr lang="de-DE" noProof="0" dirty="0"/>
-              <a:t>Um den „Late Signing Mode“ zu beenden muss das  POS System einen Nullbeleg an die ft.Middleware senden. Die Middleware antwortet mit dem ftState = 0x00, das bedeutet, dass sie den “Late Signing Mode“ verlassen hat und für den Normalbetrieb zur Verfügung steht. </a:t>
+              <a:t>Um den „Late Signing Mode“ (Nacherfassung der Belegdaten) zu beenden muss das POS System einen Nullbeleg an die Queue senden. Die Queue antwortet mit dem ftState = 0x00, das bedeutet, dass sie den “Late Signing Mode“ verlassen hat und für den Normalbetrieb zur Verfügung steht. </a:t>
             </a:r>
           </a:p>
         </p:txBody>
@@ -7926,7 +7932,31 @@
                 <a:ea typeface="+mn-ea"/>
                 <a:cs typeface="+mn-cs"/>
               </a:rPr>
-              <a:t>Die Queue ist eine Komponente der ft.Middleware, sammelt die Belege und ist für das Erzeugen und Persistieren der Belegkette verantwortlich. Des Weiteren ist die Queue die Komponente der ft.Middleware mit der Ihr  POS System kommuniziert. An sie senden Sie Ihre Belegdaten und erhalten Signaturen und andere Daten zurück.</a:t>
+              <a:t>Die Queue ist eine Komponente der ft.Middleware, sammelt die Belege und ist für das Erzeugen und Persistieren der Belegkette verantwortlich. Des Weiteren ist die Queue die Komponente der ft.Middleware mit der Ihr  POS System kommuniziert. An sie senden Sie Ihre Belegdaten und erhalten Signaturen und andere Daten zurück. Hier muss der Kommunikations-Endpunkt und die </a:t>
+            </a:r>
+            <a:r>
+              <a:rPr lang="de-DE" sz="1200" b="0" i="0" kern="1200" dirty="0" err="1">
+                <a:solidFill>
+                  <a:schemeClr val="tx1"/>
+                </a:solidFill>
+                <a:effectLst/>
+                <a:latin typeface="+mn-lt"/>
+                <a:ea typeface="+mn-ea"/>
+                <a:cs typeface="+mn-cs"/>
+              </a:rPr>
+              <a:t>Persistenzschicht</a:t>
+            </a:r>
+            <a:r>
+              <a:rPr lang="de-DE" sz="1200" b="0" i="0" kern="1200" dirty="0">
+                <a:solidFill>
+                  <a:schemeClr val="tx1"/>
+                </a:solidFill>
+                <a:effectLst/>
+                <a:latin typeface="+mn-lt"/>
+                <a:ea typeface="+mn-ea"/>
+                <a:cs typeface="+mn-cs"/>
+              </a:rPr>
+              <a:t> konfiguriert werden. </a:t>
             </a:r>
           </a:p>
           <a:p>
@@ -7951,7 +7981,7 @@
                 <a:ea typeface="+mn-ea"/>
                 <a:cs typeface="+mn-cs"/>
               </a:rPr>
-              <a:t>Die SCU (Security Creation Unit, deutsch: Signatur-Erstellungs-Einheit) ist eine Komponente der ft.Middelware, die für die Signierung zuständig ist. In Deutschland übernimmt sie die Kommunikation mit der TSE, die schlussendlich die Signierung vornimmt. Je nachdem welche TSE Sie benutzen möchten, benötigt die SCU eine entsprechende Konfiguration um auf diese zugreifen zu können.</a:t>
+              <a:t>Die SCU (Security Creation Unit, deutsch: Signatur-Erstellungs-Einheit) ist eine Komponente der ft.Middelware, die für die Signierung zuständig ist. In Deutschland übernimmt sie die Kommunikation mit der TSE, die schlussendlich die Signierung vornimmt. Je nachdem welche TSE Sie benutzen möchten, benötigt die SCU eine entsprechende Konfiguration um auf diese zugreifen zu können. Zudem muss der Kommunikations-Endpunkt konfiguriert werden, damit eine oder mehrere Queues darauf zugreifen können.</a:t>
             </a:r>
           </a:p>
           <a:p>
@@ -9121,6 +9151,54 @@
           <a:bodyPr/>
           <a:lstStyle/>
           <a:p>
+            <a:r>
+              <a:rPr lang="de-DE" dirty="0"/>
+              <a:t>https://</a:t>
+            </a:r>
+            <a:r>
+              <a:rPr lang="de-DE" dirty="0" err="1"/>
+              <a:t>docs.fiskaltrust.cloud</a:t>
+            </a:r>
+            <a:r>
+              <a:rPr lang="de-DE" dirty="0"/>
+              <a:t>/</a:t>
+            </a:r>
+            <a:r>
+              <a:rPr lang="de-DE" dirty="0" err="1"/>
+              <a:t>doc</a:t>
+            </a:r>
+            <a:r>
+              <a:rPr lang="de-DE" dirty="0"/>
+              <a:t>/</a:t>
+            </a:r>
+            <a:r>
+              <a:rPr lang="de-DE" dirty="0" err="1"/>
+              <a:t>productdescription</a:t>
+            </a:r>
+            <a:r>
+              <a:rPr lang="de-DE" dirty="0"/>
+              <a:t>-de-</a:t>
+            </a:r>
+            <a:r>
+              <a:rPr lang="de-DE" dirty="0" err="1"/>
+              <a:t>doc</a:t>
+            </a:r>
+            <a:r>
+              <a:rPr lang="de-DE" dirty="0"/>
+              <a:t>/</a:t>
+            </a:r>
+            <a:r>
+              <a:rPr lang="de-DE" dirty="0" err="1"/>
+              <a:t>for-posdealers</a:t>
+            </a:r>
+            <a:r>
+              <a:rPr lang="de-DE" dirty="0"/>
+              <a:t>/02-pre-sales/automatisierter-</a:t>
+            </a:r>
+            <a:r>
+              <a:rPr lang="de-DE" dirty="0" err="1"/>
+              <a:t>rollout.html</a:t>
+            </a:r>
             <a:endParaRPr lang="de-DE" dirty="0"/>
           </a:p>
         </p:txBody>
@@ -12559,10 +12637,10 @@
       </p:pic>
       <p:pic>
         <p:nvPicPr>
-          <p:cNvPr id="11" name="Picture 10" descr="A picture containing diagram&#10;&#10;Description automatically generated">
+          <p:cNvPr id="8" name="Picture 7" descr="A picture containing graphical user interface&#10;&#10;Description automatically generated">
             <a:extLst>
               <a:ext uri="{FF2B5EF4-FFF2-40B4-BE49-F238E27FC236}">
-                <a16:creationId xmlns:a16="http://schemas.microsoft.com/office/drawing/2014/main" id="{039F7D29-D1D6-064F-819A-6B1E2B20476A}"/>
+                <a16:creationId xmlns:a16="http://schemas.microsoft.com/office/drawing/2014/main" id="{D7F44EF5-7538-C04E-94AE-55C5FCD13A16}"/>
               </a:ext>
             </a:extLst>
           </p:cNvPr>
@@ -12585,8 +12663,8 @@
         </p:blipFill>
         <p:spPr>
           <a:xfrm>
-            <a:off x="784412" y="1264132"/>
-            <a:ext cx="10623176" cy="4329735"/>
+            <a:off x="577515" y="1274432"/>
+            <a:ext cx="11173248" cy="4309136"/>
           </a:xfrm>
           <a:prstGeom prst="rect">
             <a:avLst/>
@@ -12738,10 +12816,10 @@
       </p:pic>
       <p:pic>
         <p:nvPicPr>
-          <p:cNvPr id="9" name="Picture 8" descr="A picture containing diagram&#10;&#10;Description automatically generated">
+          <p:cNvPr id="9" name="Picture 8" descr="A picture containing sitting, monitor, computer, screen&#10;&#10;Description automatically generated">
             <a:extLst>
               <a:ext uri="{FF2B5EF4-FFF2-40B4-BE49-F238E27FC236}">
-                <a16:creationId xmlns:a16="http://schemas.microsoft.com/office/drawing/2014/main" id="{987CA088-DA30-CE47-AF0F-8EEBB9F93874}"/>
+                <a16:creationId xmlns:a16="http://schemas.microsoft.com/office/drawing/2014/main" id="{A4E1B27F-944F-9C42-878F-D6C3FD63ADCC}"/>
               </a:ext>
             </a:extLst>
           </p:cNvPr>
@@ -12764,8 +12842,8 @@
         </p:blipFill>
         <p:spPr>
           <a:xfrm>
-            <a:off x="609600" y="1192884"/>
-            <a:ext cx="10972800" cy="4472232"/>
+            <a:off x="577515" y="1376999"/>
+            <a:ext cx="11159836" cy="4104001"/>
           </a:xfrm>
           <a:prstGeom prst="rect">
             <a:avLst/>
@@ -12917,10 +12995,10 @@
       </p:pic>
       <p:pic>
         <p:nvPicPr>
-          <p:cNvPr id="13" name="Picture 12" descr="A picture containing graphical user interface&#10;&#10;Description automatically generated">
+          <p:cNvPr id="8" name="Picture 7" descr="A picture containing diagram&#10;&#10;Description automatically generated">
             <a:extLst>
               <a:ext uri="{FF2B5EF4-FFF2-40B4-BE49-F238E27FC236}">
-                <a16:creationId xmlns:a16="http://schemas.microsoft.com/office/drawing/2014/main" id="{61B9C6D4-847E-0D48-8DC9-B2A7D914EEBE}"/>
+                <a16:creationId xmlns:a16="http://schemas.microsoft.com/office/drawing/2014/main" id="{429BAD5C-ED68-C244-8A6D-859FDC459676}"/>
               </a:ext>
             </a:extLst>
           </p:cNvPr>
@@ -12943,8 +13021,8 @@
         </p:blipFill>
         <p:spPr>
           <a:xfrm>
-            <a:off x="297872" y="1764695"/>
-            <a:ext cx="11596255" cy="3747262"/>
+            <a:off x="577515" y="1434444"/>
+            <a:ext cx="11180618" cy="3989111"/>
           </a:xfrm>
           <a:prstGeom prst="rect">
             <a:avLst/>
@@ -13096,10 +13174,10 @@
       </p:pic>
       <p:pic>
         <p:nvPicPr>
-          <p:cNvPr id="11" name="Picture 10" descr="A picture containing graphical user interface&#10;&#10;Description automatically generated">
+          <p:cNvPr id="8" name="Picture 7" descr="A picture containing diagram&#10;&#10;Description automatically generated">
             <a:extLst>
               <a:ext uri="{FF2B5EF4-FFF2-40B4-BE49-F238E27FC236}">
-                <a16:creationId xmlns:a16="http://schemas.microsoft.com/office/drawing/2014/main" id="{78545DED-1289-0245-948C-777B91380C44}"/>
+                <a16:creationId xmlns:a16="http://schemas.microsoft.com/office/drawing/2014/main" id="{7248A0FA-6F36-7049-902E-BB796DEF51E9}"/>
               </a:ext>
             </a:extLst>
           </p:cNvPr>
@@ -13122,8 +13200,8 @@
         </p:blipFill>
         <p:spPr>
           <a:xfrm>
-            <a:off x="329045" y="1764695"/>
-            <a:ext cx="11533909" cy="3727115"/>
+            <a:off x="577515" y="1439543"/>
+            <a:ext cx="11139055" cy="3974282"/>
           </a:xfrm>
           <a:prstGeom prst="rect">
             <a:avLst/>
@@ -13275,10 +13353,10 @@
       </p:pic>
       <p:pic>
         <p:nvPicPr>
-          <p:cNvPr id="9" name="Picture 8" descr="A picture containing object, clock, computer, dark&#10;&#10;Description automatically generated">
+          <p:cNvPr id="4" name="Picture 3" descr="A picture containing schematic&#10;&#10;Description automatically generated">
             <a:extLst>
               <a:ext uri="{FF2B5EF4-FFF2-40B4-BE49-F238E27FC236}">
-                <a16:creationId xmlns:a16="http://schemas.microsoft.com/office/drawing/2014/main" id="{5A0C8B7F-4E3B-7A47-BC01-557E03C58D39}"/>
+                <a16:creationId xmlns:a16="http://schemas.microsoft.com/office/drawing/2014/main" id="{6183F112-E2FA-A744-AC55-7AA1BA7FF861}"/>
               </a:ext>
             </a:extLst>
           </p:cNvPr>
@@ -13301,8 +13379,8 @@
         </p:blipFill>
         <p:spPr>
           <a:xfrm>
-            <a:off x="2048452" y="1803617"/>
-            <a:ext cx="8095095" cy="3998912"/>
+            <a:off x="577515" y="1377062"/>
+            <a:ext cx="7645969" cy="4103876"/>
           </a:xfrm>
           <a:prstGeom prst="rect">
             <a:avLst/>
@@ -13454,10 +13532,10 @@
       </p:pic>
       <p:pic>
         <p:nvPicPr>
-          <p:cNvPr id="9" name="Picture 8" descr="A picture containing graphical user interface&#10;&#10;Description automatically generated">
+          <p:cNvPr id="4" name="Picture 3" descr="A picture containing diagram&#10;&#10;Description automatically generated">
             <a:extLst>
               <a:ext uri="{FF2B5EF4-FFF2-40B4-BE49-F238E27FC236}">
-                <a16:creationId xmlns:a16="http://schemas.microsoft.com/office/drawing/2014/main" id="{7164A7F4-45E8-3A4D-AB95-56927B6D7788}"/>
+                <a16:creationId xmlns:a16="http://schemas.microsoft.com/office/drawing/2014/main" id="{671A3BD0-5176-7F46-81BF-D65814C70A94}"/>
               </a:ext>
             </a:extLst>
           </p:cNvPr>
@@ -13480,8 +13558,8 @@
         </p:blipFill>
         <p:spPr>
           <a:xfrm>
-            <a:off x="577515" y="1729349"/>
-            <a:ext cx="11326091" cy="3778768"/>
+            <a:off x="577515" y="1384641"/>
+            <a:ext cx="11118273" cy="4088717"/>
           </a:xfrm>
           <a:prstGeom prst="rect">
             <a:avLst/>
@@ -13561,33 +13639,6 @@
       </p:sp>
       <p:pic>
         <p:nvPicPr>
-          <p:cNvPr id="5" name="Content Placeholder 4">
-            <a:extLst>
-              <a:ext uri="{FF2B5EF4-FFF2-40B4-BE49-F238E27FC236}">
-                <a16:creationId xmlns:a16="http://schemas.microsoft.com/office/drawing/2014/main" id="{AAD9D593-4D41-3A4A-9513-9042BB107570}"/>
-              </a:ext>
-            </a:extLst>
-          </p:cNvPr>
-          <p:cNvPicPr>
-            <a:picLocks noGrp="1" noChangeAspect="1"/>
-          </p:cNvPicPr>
-          <p:nvPr>
-            <p:ph idx="1"/>
-          </p:nvPr>
-        </p:nvPicPr>
-        <p:blipFill>
-          <a:blip r:embed="rId3"/>
-          <a:stretch/>
-        </p:blipFill>
-        <p:spPr>
-          <a:xfrm>
-            <a:off x="693999" y="1154113"/>
-            <a:ext cx="10848451" cy="5100637"/>
-          </a:xfrm>
-        </p:spPr>
-      </p:pic>
-      <p:pic>
-        <p:nvPicPr>
           <p:cNvPr id="6" name="Grafik 12" descr="Ein Bild, das Zeichnung, Schild enthält.&#10;&#10;Automatisch generierte Beschreibung">
             <a:extLst>
               <a:ext uri="{FF2B5EF4-FFF2-40B4-BE49-F238E27FC236}">
@@ -13601,7 +13652,7 @@
           <p:nvPr/>
         </p:nvPicPr>
         <p:blipFill>
-          <a:blip r:embed="rId4">
+          <a:blip r:embed="rId3">
             <a:extLst>
               <a:ext uri="{28A0092B-C50C-407E-A947-70E740481C1C}">
                 <a14:useLocalDpi xmlns:a14="http://schemas.microsoft.com/office/drawing/2010/main" val="0"/>
@@ -13637,7 +13688,7 @@
           <p:nvPr/>
         </p:nvPicPr>
         <p:blipFill rotWithShape="1">
-          <a:blip r:embed="rId5">
+          <a:blip r:embed="rId4">
             <a:alphaModFix amt="15000"/>
             <a:extLst>
               <a:ext uri="{28A0092B-C50C-407E-A947-70E740481C1C}">
@@ -13652,6 +13703,42 @@
           <a:xfrm>
             <a:off x="10313964" y="5093305"/>
             <a:ext cx="1886400" cy="1801618"/>
+          </a:xfrm>
+          <a:prstGeom prst="rect">
+            <a:avLst/>
+          </a:prstGeom>
+        </p:spPr>
+      </p:pic>
+      <p:pic>
+        <p:nvPicPr>
+          <p:cNvPr id="4" name="Picture 3" descr="A picture containing diagram&#10;&#10;Description automatically generated">
+            <a:extLst>
+              <a:ext uri="{FF2B5EF4-FFF2-40B4-BE49-F238E27FC236}">
+                <a16:creationId xmlns:a16="http://schemas.microsoft.com/office/drawing/2014/main" id="{392D10F1-0393-C246-8126-40EE9CF2648B}"/>
+              </a:ext>
+            </a:extLst>
+          </p:cNvPr>
+          <p:cNvPicPr>
+            <a:picLocks noChangeAspect="1"/>
+          </p:cNvPicPr>
+          <p:nvPr/>
+        </p:nvPicPr>
+        <p:blipFill>
+          <a:blip r:embed="rId5">
+            <a:extLst>
+              <a:ext uri="{28A0092B-C50C-407E-A947-70E740481C1C}">
+                <a14:useLocalDpi xmlns:a14="http://schemas.microsoft.com/office/drawing/2010/main" val="0"/>
+              </a:ext>
+            </a:extLst>
+          </a:blip>
+          <a:stretch>
+            <a:fillRect/>
+          </a:stretch>
+        </p:blipFill>
+        <p:spPr>
+          <a:xfrm>
+            <a:off x="577515" y="1373178"/>
+            <a:ext cx="11180618" cy="4111644"/>
           </a:xfrm>
           <a:prstGeom prst="rect">
             <a:avLst/>
@@ -14126,54 +14213,20 @@
           <a:lstStyle/>
           <a:p>
             <a:r>
-              <a:rPr lang="de-DE" dirty="0"/>
+              <a:rPr lang="de-DE"/>
               <a:t>Konfiguration einer Middleware Instanz</a:t>
             </a:r>
             <a:br>
-              <a:rPr lang="de-DE" dirty="0"/>
+              <a:rPr lang="de-DE"/>
             </a:br>
             <a:r>
-              <a:rPr lang="de-DE" sz="2800" dirty="0"/>
-              <a:t>(</a:t>
-            </a:r>
-            <a:r>
-              <a:rPr lang="de-DE" sz="2800" dirty="0" err="1"/>
-              <a:t>Cashbox</a:t>
-            </a:r>
-            <a:r>
-              <a:rPr lang="de-DE" sz="2800" dirty="0"/>
-              <a:t>)</a:t>
-            </a:r>
+              <a:rPr lang="de-DE" sz="2800"/>
+              <a:t>(Cashbox)</a:t>
+            </a:r>
+            <a:endParaRPr lang="de-DE" sz="2800" dirty="0"/>
           </a:p>
         </p:txBody>
       </p:sp>
-      <p:pic>
-        <p:nvPicPr>
-          <p:cNvPr id="5" name="Content Placeholder 4">
-            <a:extLst>
-              <a:ext uri="{FF2B5EF4-FFF2-40B4-BE49-F238E27FC236}">
-                <a16:creationId xmlns:a16="http://schemas.microsoft.com/office/drawing/2014/main" id="{3882BB4F-0055-4644-BBCB-8F314674135A}"/>
-              </a:ext>
-            </a:extLst>
-          </p:cNvPr>
-          <p:cNvPicPr>
-            <a:picLocks noGrp="1" noChangeAspect="1"/>
-          </p:cNvPicPr>
-          <p:nvPr>
-            <p:ph idx="1"/>
-          </p:nvPr>
-        </p:nvPicPr>
-        <p:blipFill>
-          <a:blip r:embed="rId3"/>
-          <a:stretch/>
-        </p:blipFill>
-        <p:spPr>
-          <a:xfrm>
-            <a:off x="632511" y="1552050"/>
-            <a:ext cx="10971428" cy="4304762"/>
-          </a:xfrm>
-        </p:spPr>
-      </p:pic>
       <p:pic>
         <p:nvPicPr>
           <p:cNvPr id="6" name="Grafik 12" descr="Ein Bild, das Zeichnung, Schild enthält.&#10;&#10;Automatisch generierte Beschreibung">
@@ -14189,7 +14242,7 @@
           <p:nvPr/>
         </p:nvPicPr>
         <p:blipFill>
-          <a:blip r:embed="rId4">
+          <a:blip r:embed="rId3">
             <a:extLst>
               <a:ext uri="{28A0092B-C50C-407E-A947-70E740481C1C}">
                 <a14:useLocalDpi xmlns:a14="http://schemas.microsoft.com/office/drawing/2010/main" val="0"/>
@@ -14225,7 +14278,7 @@
           <p:nvPr/>
         </p:nvPicPr>
         <p:blipFill rotWithShape="1">
-          <a:blip r:embed="rId5">
+          <a:blip r:embed="rId4">
             <a:alphaModFix amt="15000"/>
             <a:extLst>
               <a:ext uri="{28A0092B-C50C-407E-A947-70E740481C1C}">
@@ -14240,6 +14293,42 @@
           <a:xfrm>
             <a:off x="10313964" y="5093305"/>
             <a:ext cx="1886400" cy="1801618"/>
+          </a:xfrm>
+          <a:prstGeom prst="rect">
+            <a:avLst/>
+          </a:prstGeom>
+        </p:spPr>
+      </p:pic>
+      <p:pic>
+        <p:nvPicPr>
+          <p:cNvPr id="9" name="Picture 8">
+            <a:extLst>
+              <a:ext uri="{FF2B5EF4-FFF2-40B4-BE49-F238E27FC236}">
+                <a16:creationId xmlns:a16="http://schemas.microsoft.com/office/drawing/2014/main" id="{21249C42-B425-8840-8EE1-16AEF6954F20}"/>
+              </a:ext>
+            </a:extLst>
+          </p:cNvPr>
+          <p:cNvPicPr>
+            <a:picLocks noChangeAspect="1"/>
+          </p:cNvPicPr>
+          <p:nvPr/>
+        </p:nvPicPr>
+        <p:blipFill>
+          <a:blip r:embed="rId5">
+            <a:extLst>
+              <a:ext uri="{28A0092B-C50C-407E-A947-70E740481C1C}">
+                <a14:useLocalDpi xmlns:a14="http://schemas.microsoft.com/office/drawing/2010/main" val="0"/>
+              </a:ext>
+            </a:extLst>
+          </a:blip>
+          <a:stretch>
+            <a:fillRect/>
+          </a:stretch>
+        </p:blipFill>
+        <p:spPr>
+          <a:xfrm>
+            <a:off x="596900" y="2192482"/>
+            <a:ext cx="10998200" cy="3429000"/>
           </a:xfrm>
           <a:prstGeom prst="rect">
             <a:avLst/>
@@ -14585,82 +14674,8 @@
             </a:pPr>
             <a:r>
               <a:rPr lang="de-DE" dirty="0"/>
-              <a:t>Getting started Guide</a:t>
-            </a:r>
-          </a:p>
-          <a:p>
-            <a:pPr lvl="1">
-              <a:lnSpc>
-                <a:spcPct val="100000"/>
-              </a:lnSpc>
-              <a:spcBef>
-                <a:spcPts val="600"/>
-              </a:spcBef>
-              <a:spcAft>
-                <a:spcPts val="600"/>
-              </a:spcAft>
-            </a:pPr>
-            <a:r>
-              <a:rPr lang="de-DE" dirty="0"/>
-              <a:t>Anlegen einer </a:t>
-            </a:r>
-            <a:r>
-              <a:rPr lang="de-DE" dirty="0" err="1"/>
-              <a:t>Cashbox</a:t>
-            </a:r>
-            <a:endParaRPr lang="de-DE" dirty="0"/>
-          </a:p>
-          <a:p>
-            <a:pPr lvl="1">
-              <a:lnSpc>
-                <a:spcPct val="100000"/>
-              </a:lnSpc>
-              <a:spcBef>
-                <a:spcPts val="600"/>
-              </a:spcBef>
-              <a:spcAft>
-                <a:spcPts val="600"/>
-              </a:spcAft>
-            </a:pPr>
-            <a:r>
-              <a:rPr lang="de-DE" dirty="0"/>
-              <a:t>Download des Launcher aus dem Portal</a:t>
-            </a:r>
-          </a:p>
-          <a:p>
-            <a:pPr lvl="1">
-              <a:lnSpc>
-                <a:spcPct val="100000"/>
-              </a:lnSpc>
-              <a:spcBef>
-                <a:spcPts val="600"/>
-              </a:spcBef>
-              <a:spcAft>
-                <a:spcPts val="600"/>
-              </a:spcAft>
-            </a:pPr>
-            <a:r>
-              <a:rPr lang="de-DE" dirty="0"/>
-              <a:t>Starten des Launcher (lokal)</a:t>
-            </a:r>
-          </a:p>
-          <a:p>
-            <a:pPr lvl="1">
-              <a:lnSpc>
-                <a:spcPct val="100000"/>
-              </a:lnSpc>
-              <a:spcBef>
-                <a:spcPts val="600"/>
-              </a:spcBef>
-              <a:spcAft>
-                <a:spcPts val="600"/>
-              </a:spcAft>
-            </a:pPr>
-            <a:r>
-              <a:rPr lang="de-DE" dirty="0"/>
-              <a:t>Aufruf der Middleware aus dem  POS System</a:t>
-            </a:r>
-            <a:endParaRPr lang="de-DE" sz="2000" dirty="0"/>
+              <a:t>Getting started Guide (Schritte der Integration)</a:t>
+            </a:r>
           </a:p>
           <a:p>
             <a:pPr>
@@ -15192,7 +15207,7 @@
             </a:pPr>
             <a:r>
               <a:rPr lang="de-DE" dirty="0"/>
-              <a:t>Branchenspezifische Diskussion komplexer Geschäftsfälle mit dem fiskaltrust Support Team</a:t>
+              <a:t>Einladung der Kassenhändler, Rollout/Templating vorbereiten</a:t>
             </a:r>
           </a:p>
           <a:p>
@@ -15209,7 +15224,7 @@
             </a:pPr>
             <a:r>
               <a:rPr lang="de-DE" dirty="0"/>
-              <a:t>Einladung der Kassenhändler, Rollout/Templating vorbereiten</a:t>
+              <a:t>Branchenspezifische Diskussion komplexer Geschäftsfälle mit dem fiskaltrust Support Team</a:t>
             </a:r>
           </a:p>
           <a:p>
@@ -15226,8 +15241,13 @@
             </a:pPr>
             <a:r>
               <a:rPr lang="de-DE" dirty="0"/>
-              <a:t>Pilotinstallation</a:t>
-            </a:r>
+              <a:t>Pilotinstallation in Zusammenarbeit </a:t>
+            </a:r>
+            <a:r>
+              <a:rPr lang="de-DE"/>
+              <a:t>mit Kassenhändler</a:t>
+            </a:r>
+            <a:endParaRPr lang="de-DE" dirty="0"/>
           </a:p>
           <a:p>
             <a:pPr>
@@ -15243,7 +15263,7 @@
             </a:pPr>
             <a:r>
               <a:rPr lang="de-DE" dirty="0"/>
-              <a:t>Übergabe zum Rollout an Ihre Kassenhändler</a:t>
+              <a:t>Übergabe zum Massen-Rollout an Ihre Kassenhändler</a:t>
             </a:r>
           </a:p>
         </p:txBody>
@@ -15960,19 +15980,17 @@
       </p:pic>
       <p:pic>
         <p:nvPicPr>
-          <p:cNvPr id="9" name="Content Placeholder 8" descr="Graphical user interface, website&#10;&#10;Description automatically generated">
+          <p:cNvPr id="11" name="Picture 10" descr="Graphical user interface, website&#10;&#10;Description automatically generated">
             <a:extLst>
               <a:ext uri="{FF2B5EF4-FFF2-40B4-BE49-F238E27FC236}">
-                <a16:creationId xmlns:a16="http://schemas.microsoft.com/office/drawing/2014/main" id="{53188762-75D3-264D-96A0-9BBD8C56A7F0}"/>
+                <a16:creationId xmlns:a16="http://schemas.microsoft.com/office/drawing/2014/main" id="{53FC3A7D-3632-D84D-8DF0-6DF92869EAF5}"/>
               </a:ext>
             </a:extLst>
           </p:cNvPr>
           <p:cNvPicPr>
-            <a:picLocks noGrp="1" noChangeAspect="1"/>
+            <a:picLocks noChangeAspect="1"/>
           </p:cNvPicPr>
-          <p:nvPr>
-            <p:ph idx="1"/>
-          </p:nvPr>
+          <p:nvPr/>
         </p:nvPicPr>
         <p:blipFill>
           <a:blip r:embed="rId5">
@@ -15988,9 +16006,12 @@
         </p:blipFill>
         <p:spPr>
           <a:xfrm>
-            <a:off x="415804" y="1664408"/>
-            <a:ext cx="14454578" cy="4278379"/>
+            <a:off x="577515" y="1764695"/>
+            <a:ext cx="13643883" cy="4031147"/>
           </a:xfrm>
+          <a:prstGeom prst="rect">
+            <a:avLst/>
+          </a:prstGeom>
         </p:spPr>
       </p:pic>
     </p:spTree>
@@ -16076,7 +16097,7 @@
             <p:ph idx="1"/>
             <p:extLst>
               <p:ext uri="{D42A27DB-BD31-4B8C-83A1-F6EECF244321}">
-                <p14:modId xmlns:p14="http://schemas.microsoft.com/office/powerpoint/2010/main" val="1521587438"/>
+                <p14:modId xmlns:p14="http://schemas.microsoft.com/office/powerpoint/2010/main" val="322269447"/>
               </p:ext>
             </p:extLst>
           </p:nvPr>
@@ -16304,10 +16325,10 @@
       </p:pic>
       <p:pic>
         <p:nvPicPr>
-          <p:cNvPr id="9" name="Content Placeholder 8" descr="A picture containing graphical user interface&#10;&#10;Description automatically generated">
+          <p:cNvPr id="8" name="Content Placeholder 7" descr="A picture containing graphical user interface&#10;&#10;Description automatically generated">
             <a:extLst>
               <a:ext uri="{FF2B5EF4-FFF2-40B4-BE49-F238E27FC236}">
-                <a16:creationId xmlns:a16="http://schemas.microsoft.com/office/drawing/2014/main" id="{D0E55A44-812B-E145-8CBE-FFDA17D9BD53}"/>
+                <a16:creationId xmlns:a16="http://schemas.microsoft.com/office/drawing/2014/main" id="{E8CBC215-B476-7E41-B85D-D2C7C86AF44B}"/>
               </a:ext>
             </a:extLst>
           </p:cNvPr>
@@ -16332,8 +16353,8 @@
         </p:blipFill>
         <p:spPr>
           <a:xfrm>
-            <a:off x="1713284" y="1333999"/>
-            <a:ext cx="8765432" cy="5261201"/>
+            <a:off x="2056299" y="1494563"/>
+            <a:ext cx="8497924" cy="5100637"/>
           </a:xfrm>
         </p:spPr>
       </p:pic>
@@ -16801,33 +16822,6 @@
       </p:sp>
       <p:pic>
         <p:nvPicPr>
-          <p:cNvPr id="5" name="Content Placeholder 4">
-            <a:extLst>
-              <a:ext uri="{FF2B5EF4-FFF2-40B4-BE49-F238E27FC236}">
-                <a16:creationId xmlns:a16="http://schemas.microsoft.com/office/drawing/2014/main" id="{3882BB4F-0055-4644-BBCB-8F314674135A}"/>
-              </a:ext>
-            </a:extLst>
-          </p:cNvPr>
-          <p:cNvPicPr>
-            <a:picLocks noGrp="1" noChangeAspect="1"/>
-          </p:cNvPicPr>
-          <p:nvPr>
-            <p:ph idx="1"/>
-          </p:nvPr>
-        </p:nvPicPr>
-        <p:blipFill>
-          <a:blip r:embed="rId3"/>
-          <a:stretch/>
-        </p:blipFill>
-        <p:spPr>
-          <a:xfrm>
-            <a:off x="311719" y="2992798"/>
-            <a:ext cx="11065368" cy="1381494"/>
-          </a:xfrm>
-        </p:spPr>
-      </p:pic>
-      <p:pic>
-        <p:nvPicPr>
           <p:cNvPr id="8" name="Grafik 12" descr="Ein Bild, das Zeichnung, Schild enthält.&#10;&#10;Automatisch generierte Beschreibung">
             <a:extLst>
               <a:ext uri="{FF2B5EF4-FFF2-40B4-BE49-F238E27FC236}">
@@ -16841,7 +16835,7 @@
           <p:nvPr/>
         </p:nvPicPr>
         <p:blipFill>
-          <a:blip r:embed="rId4">
+          <a:blip r:embed="rId3">
             <a:extLst>
               <a:ext uri="{28A0092B-C50C-407E-A947-70E740481C1C}">
                 <a14:useLocalDpi xmlns:a14="http://schemas.microsoft.com/office/drawing/2010/main" val="0"/>
@@ -16877,7 +16871,7 @@
           <p:nvPr/>
         </p:nvPicPr>
         <p:blipFill rotWithShape="1">
-          <a:blip r:embed="rId5">
+          <a:blip r:embed="rId4">
             <a:alphaModFix amt="15000"/>
             <a:extLst>
               <a:ext uri="{28A0092B-C50C-407E-A947-70E740481C1C}">
@@ -16898,6 +16892,64 @@
           </a:prstGeom>
         </p:spPr>
       </p:pic>
+      <p:sp>
+        <p:nvSpPr>
+          <p:cNvPr id="4" name="Content Placeholder 3">
+            <a:extLst>
+              <a:ext uri="{FF2B5EF4-FFF2-40B4-BE49-F238E27FC236}">
+                <a16:creationId xmlns:a16="http://schemas.microsoft.com/office/drawing/2014/main" id="{27658C07-E61B-714C-99AE-322A524C6E61}"/>
+              </a:ext>
+            </a:extLst>
+          </p:cNvPr>
+          <p:cNvSpPr>
+            <a:spLocks noGrp="1"/>
+          </p:cNvSpPr>
+          <p:nvPr>
+            <p:ph idx="1"/>
+          </p:nvPr>
+        </p:nvSpPr>
+        <p:spPr/>
+        <p:txBody>
+          <a:bodyPr/>
+          <a:lstStyle/>
+          <a:p>
+            <a:endParaRPr lang="de-DE" dirty="0"/>
+          </a:p>
+          <a:p>
+            <a:endParaRPr lang="de-DE" dirty="0"/>
+          </a:p>
+          <a:p>
+            <a:r>
+              <a:rPr lang="de-DE" dirty="0"/>
+              <a:t>Manuell über Portal</a:t>
+            </a:r>
+          </a:p>
+          <a:p>
+            <a:pPr lvl="1"/>
+            <a:r>
+              <a:rPr lang="de-DE" dirty="0"/>
+              <a:t>Erfassen</a:t>
+            </a:r>
+          </a:p>
+          <a:p>
+            <a:pPr lvl="1"/>
+            <a:r>
+              <a:rPr lang="de-DE" dirty="0"/>
+              <a:t>Auschecken</a:t>
+            </a:r>
+          </a:p>
+          <a:p>
+            <a:pPr lvl="1"/>
+            <a:endParaRPr lang="de-DE" dirty="0"/>
+          </a:p>
+          <a:p>
+            <a:r>
+              <a:rPr lang="de-DE" dirty="0"/>
+              <a:t>Automatisiert über API</a:t>
+            </a:r>
+          </a:p>
+        </p:txBody>
+      </p:sp>
     </p:spTree>
     <p:extLst>
       <p:ext uri="{BB962C8B-B14F-4D97-AF65-F5344CB8AC3E}">
@@ -18247,10 +18299,10 @@
       </p:pic>
       <p:pic>
         <p:nvPicPr>
-          <p:cNvPr id="6" name="Picture 5" descr="Diagram&#10;&#10;Description automatically generated">
+          <p:cNvPr id="4" name="Picture 3" descr="Diagram&#10;&#10;Description automatically generated">
             <a:extLst>
               <a:ext uri="{FF2B5EF4-FFF2-40B4-BE49-F238E27FC236}">
-                <a16:creationId xmlns:a16="http://schemas.microsoft.com/office/drawing/2014/main" id="{8CD46450-50B4-7A40-8CF0-E3F911992441}"/>
+                <a16:creationId xmlns:a16="http://schemas.microsoft.com/office/drawing/2014/main" id="{1600331C-BE5A-1341-8023-E2DD29DA47A3}"/>
               </a:ext>
             </a:extLst>
           </p:cNvPr>
@@ -18273,8 +18325,8 @@
         </p:blipFill>
         <p:spPr>
           <a:xfrm>
-            <a:off x="576212" y="2063082"/>
-            <a:ext cx="10680952" cy="3679992"/>
+            <a:off x="431800" y="1479550"/>
+            <a:ext cx="11328400" cy="3898900"/>
           </a:xfrm>
           <a:prstGeom prst="rect">
             <a:avLst/>
@@ -19516,12 +19568,6 @@
 </file>
 
 <file path=customXml/item1.xml><?xml version="1.0" encoding="utf-8"?>
-<p:properties xmlns:p="http://schemas.microsoft.com/office/2006/metadata/properties" xmlns:xsi="http://www.w3.org/2001/XMLSchema-instance" xmlns:pc="http://schemas.microsoft.com/office/infopath/2007/PartnerControls">
-  <documentManagement/>
-</p:properties>
-</file>
-
-<file path=customXml/item2.xml><?xml version="1.0" encoding="utf-8"?>
 <ct:contentTypeSchema xmlns:ct="http://schemas.microsoft.com/office/2006/metadata/contentType" xmlns:ma="http://schemas.microsoft.com/office/2006/metadata/properties/metaAttributes" ct:_="" ma:_="" ma:contentTypeName="Document" ma:contentTypeID="0x01010003A087929988544A956B845A242A1874" ma:contentTypeVersion="9" ma:contentTypeDescription="Create a new document." ma:contentTypeScope="" ma:versionID="a063f29419c0dc871a57124984a5c02e">
   <xsd:schema xmlns:xsd="http://www.w3.org/2001/XMLSchema" xmlns:xs="http://www.w3.org/2001/XMLSchema" xmlns:p="http://schemas.microsoft.com/office/2006/metadata/properties" xmlns:ns2="c3142773-ea53-476f-8961-6b85122cde25" targetNamespace="http://schemas.microsoft.com/office/2006/metadata/properties" ma:root="true" ma:fieldsID="a552620fe450120d7f85de4f65b137a4" ns2:_="">
     <xsd:import namespace="c3142773-ea53-476f-8961-6b85122cde25"/>
@@ -19699,6 +19745,12 @@
 </ct:contentTypeSchema>
 </file>
 
+<file path=customXml/item2.xml><?xml version="1.0" encoding="utf-8"?>
+<p:properties xmlns:p="http://schemas.microsoft.com/office/2006/metadata/properties" xmlns:xsi="http://www.w3.org/2001/XMLSchema-instance" xmlns:pc="http://schemas.microsoft.com/office/infopath/2007/PartnerControls">
+  <documentManagement/>
+</p:properties>
+</file>
+
 <file path=customXml/item3.xml><?xml version="1.0" encoding="utf-8"?>
 <?mso-contentType ?>
 <FormTemplates xmlns="http://schemas.microsoft.com/sharepoint/v3/contenttype/forms">
@@ -19709,15 +19761,6 @@
 </file>
 
 <file path=customXml/itemProps1.xml><?xml version="1.0" encoding="utf-8"?>
-<ds:datastoreItem xmlns:ds="http://schemas.openxmlformats.org/officeDocument/2006/customXml" ds:itemID="{A770BCC9-0480-4A5F-A5A5-05648EB42497}">
-  <ds:schemaRefs>
-    <ds:schemaRef ds:uri="http://schemas.microsoft.com/office/2006/metadata/properties"/>
-    <ds:schemaRef ds:uri="http://schemas.microsoft.com/office/infopath/2007/PartnerControls"/>
-  </ds:schemaRefs>
-</ds:datastoreItem>
-</file>
-
-<file path=customXml/itemProps2.xml><?xml version="1.0" encoding="utf-8"?>
 <ds:datastoreItem xmlns:ds="http://schemas.openxmlformats.org/officeDocument/2006/customXml" ds:itemID="{4A4E1077-0687-4F67-BE9D-7A4D4029BB02}">
   <ds:schemaRefs>
     <ds:schemaRef ds:uri="http://schemas.microsoft.com/office/2006/metadata/contentType"/>
@@ -19735,6 +19778,15 @@
 </ds:datastoreItem>
 </file>
 
+<file path=customXml/itemProps2.xml><?xml version="1.0" encoding="utf-8"?>
+<ds:datastoreItem xmlns:ds="http://schemas.openxmlformats.org/officeDocument/2006/customXml" ds:itemID="{A770BCC9-0480-4A5F-A5A5-05648EB42497}">
+  <ds:schemaRefs>
+    <ds:schemaRef ds:uri="http://schemas.microsoft.com/office/2006/metadata/properties"/>
+    <ds:schemaRef ds:uri="http://schemas.microsoft.com/office/infopath/2007/PartnerControls"/>
+  </ds:schemaRefs>
+</ds:datastoreItem>
+</file>
+
 <file path=customXml/itemProps3.xml><?xml version="1.0" encoding="utf-8"?>
 <ds:datastoreItem xmlns:ds="http://schemas.openxmlformats.org/officeDocument/2006/customXml" ds:itemID="{3F407387-4BEA-45E7-A546-EAF24BCEADF4}">
   <ds:schemaRefs>

</xml_diff>

<commit_message>
add master data recording at dealer in pos creator lead presentation
</commit_message>
<xml_diff>
--- a/for-poscreators/presentation/media/lead-presentation-creator-de.pptx
+++ b/for-poscreators/presentation/media/lead-presentation-creator-de.pptx
@@ -3018,6 +3018,48 @@
         </a:p>
       </dgm:t>
     </dgm:pt>
+    <dgm:pt modelId="{41CF67A3-9BC0-1242-9196-8912F5A617D7}">
+      <dgm:prSet phldrT="[Text]"/>
+      <dgm:spPr>
+        <a:ln>
+          <a:solidFill>
+            <a:srgbClr val="96C11F"/>
+          </a:solidFill>
+        </a:ln>
+      </dgm:spPr>
+      <dgm:t>
+        <a:bodyPr/>
+        <a:lstStyle/>
+        <a:p>
+          <a:r>
+            <a:rPr lang="de-DE" dirty="0"/>
+            <a:t>Erfassung der Stammdaten</a:t>
+          </a:r>
+        </a:p>
+      </dgm:t>
+    </dgm:pt>
+    <dgm:pt modelId="{3FF7A8DB-9988-5044-9E93-C81917AAC0FF}" type="parTrans" cxnId="{B3984AAB-AFAF-2F42-8133-008A77AF9120}">
+      <dgm:prSet/>
+      <dgm:spPr/>
+      <dgm:t>
+        <a:bodyPr/>
+        <a:lstStyle/>
+        <a:p>
+          <a:endParaRPr lang="en-GB"/>
+        </a:p>
+      </dgm:t>
+    </dgm:pt>
+    <dgm:pt modelId="{B3C94415-B5AD-2B43-BE5D-47482D2599A5}" type="sibTrans" cxnId="{B3984AAB-AFAF-2F42-8133-008A77AF9120}">
+      <dgm:prSet/>
+      <dgm:spPr/>
+      <dgm:t>
+        <a:bodyPr/>
+        <a:lstStyle/>
+        <a:p>
+          <a:endParaRPr lang="en-GB"/>
+        </a:p>
+      </dgm:t>
+    </dgm:pt>
     <dgm:pt modelId="{4AFD1DCE-7613-4DC5-B92D-15D823546BE3}" type="pres">
       <dgm:prSet presAssocID="{F0F6B17E-9533-4727-B3CC-A6D0466AC596}" presName="Name0" presStyleCnt="0">
         <dgm:presLayoutVars>
@@ -3272,19 +3314,22 @@
     <dgm:cxn modelId="{0CABC472-4160-9F4C-A268-93FFE24107B7}" type="presOf" srcId="{F1503044-3191-2B40-BFBF-6E829B69DD55}" destId="{4055B626-3956-BA4B-8E9B-4D853D53EE56}" srcOrd="0" destOrd="0" presId="urn:microsoft.com/office/officeart/2005/8/layout/hProcess4"/>
     <dgm:cxn modelId="{19CAA77D-572B-C14B-850F-460451CF944D}" srcId="{F1503044-3191-2B40-BFBF-6E829B69DD55}" destId="{526E9F08-5EA3-3D49-8B38-51CB3B3ED9DC}" srcOrd="1" destOrd="0" parTransId="{A8FA7B8A-AD7B-7C40-BF90-BED881C03EB5}" sibTransId="{955E6D0C-59A0-274E-AFEA-DA4ED5CD50D2}"/>
     <dgm:cxn modelId="{3031F17F-8F4D-4622-BCE9-55A48FDC59CF}" srcId="{D4F9471E-5DB8-4527-8A9A-3BA1BC9BC03D}" destId="{A4305718-53E2-4A7F-804A-6F3B3A68EDA1}" srcOrd="1" destOrd="0" parTransId="{6352A4B0-029B-47A9-B901-39E39478AA01}" sibTransId="{031F83FA-BA7B-481B-8A9D-B4136C226BCE}"/>
-    <dgm:cxn modelId="{DDC67486-FA59-ED49-988E-A25F5AF8168D}" type="presOf" srcId="{E5852962-6E45-A643-BB41-0565DE04E888}" destId="{F5911F88-6D16-4946-B5AD-4CB523ADAA0D}" srcOrd="1" destOrd="1" presId="urn:microsoft.com/office/officeart/2005/8/layout/hProcess4"/>
+    <dgm:cxn modelId="{35B50685-B93A-234E-B61A-517A51DE476F}" type="presOf" srcId="{41CF67A3-9BC0-1242-9196-8912F5A617D7}" destId="{F5911F88-6D16-4946-B5AD-4CB523ADAA0D}" srcOrd="1" destOrd="1" presId="urn:microsoft.com/office/officeart/2005/8/layout/hProcess4"/>
+    <dgm:cxn modelId="{DDC67486-FA59-ED49-988E-A25F5AF8168D}" type="presOf" srcId="{E5852962-6E45-A643-BB41-0565DE04E888}" destId="{F5911F88-6D16-4946-B5AD-4CB523ADAA0D}" srcOrd="1" destOrd="2" presId="urn:microsoft.com/office/officeart/2005/8/layout/hProcess4"/>
     <dgm:cxn modelId="{9231DF87-47F1-5A40-B464-64D835BB90FE}" type="presOf" srcId="{31EF9491-34BC-454F-9A90-85D7BFC3D698}" destId="{4BA1B2B1-C1B8-47F2-8C0E-ADA73BC9C811}" srcOrd="1" destOrd="1" presId="urn:microsoft.com/office/officeart/2005/8/layout/hProcess4"/>
     <dgm:cxn modelId="{987E1B8C-B626-FA4E-9F0E-D52747B21A22}" type="presOf" srcId="{47C53EB7-BB9D-3141-AC80-25FEDE4F45C1}" destId="{846A1EB4-FE5D-EA45-887E-8162064DDF67}" srcOrd="1" destOrd="1" presId="urn:microsoft.com/office/officeart/2005/8/layout/hProcess4"/>
     <dgm:cxn modelId="{5CC9B190-AC53-F34A-B368-85A895D1EBFF}" type="presOf" srcId="{D690E6B1-ED93-4978-AC10-25C06B709E1D}" destId="{4BA1B2B1-C1B8-47F2-8C0E-ADA73BC9C811}" srcOrd="1" destOrd="2" presId="urn:microsoft.com/office/officeart/2005/8/layout/hProcess4"/>
     <dgm:cxn modelId="{426FE093-C152-4565-8B88-75EEA7DB8FBF}" srcId="{F0F6B17E-9533-4727-B3CC-A6D0466AC596}" destId="{A127E4B3-65AD-4248-95B2-95D5289D7EA9}" srcOrd="0" destOrd="0" parTransId="{7EA8BFFC-7878-4C8B-AD98-3A05865402BF}" sibTransId="{1D659693-0E7A-4638-9B8A-23A860592A72}"/>
     <dgm:cxn modelId="{F9C1B7A9-40E0-564A-B370-1A359B4EDF55}" type="presOf" srcId="{580D8CE1-E595-CF43-B1D2-95FB638F080E}" destId="{846A1EB4-FE5D-EA45-887E-8162064DDF67}" srcOrd="1" destOrd="2" presId="urn:microsoft.com/office/officeart/2005/8/layout/hProcess4"/>
-    <dgm:cxn modelId="{56DA8AB2-6975-BF45-BECC-227E54288CC6}" type="presOf" srcId="{E5852962-6E45-A643-BB41-0565DE04E888}" destId="{F0B01F51-E46F-DA4B-88E1-9F10333DC2ED}" srcOrd="0" destOrd="1" presId="urn:microsoft.com/office/officeart/2005/8/layout/hProcess4"/>
+    <dgm:cxn modelId="{54E6CEA9-341A-B940-8590-8E27469D32D7}" type="presOf" srcId="{41CF67A3-9BC0-1242-9196-8912F5A617D7}" destId="{F0B01F51-E46F-DA4B-88E1-9F10333DC2ED}" srcOrd="0" destOrd="1" presId="urn:microsoft.com/office/officeart/2005/8/layout/hProcess4"/>
+    <dgm:cxn modelId="{B3984AAB-AFAF-2F42-8133-008A77AF9120}" srcId="{939A1577-2324-43EB-B7C5-B0BEC8FE22DE}" destId="{41CF67A3-9BC0-1242-9196-8912F5A617D7}" srcOrd="1" destOrd="0" parTransId="{3FF7A8DB-9988-5044-9E93-C81917AAC0FF}" sibTransId="{B3C94415-B5AD-2B43-BE5D-47482D2599A5}"/>
+    <dgm:cxn modelId="{56DA8AB2-6975-BF45-BECC-227E54288CC6}" type="presOf" srcId="{E5852962-6E45-A643-BB41-0565DE04E888}" destId="{F0B01F51-E46F-DA4B-88E1-9F10333DC2ED}" srcOrd="0" destOrd="2" presId="urn:microsoft.com/office/officeart/2005/8/layout/hProcess4"/>
     <dgm:cxn modelId="{D180BFB5-A945-5C46-A4A1-25A3C3358448}" type="presOf" srcId="{20741808-44F9-9443-B020-C2DBEB25E341}" destId="{DB47F245-2784-474A-9BA8-6F043C5AB87D}" srcOrd="0" destOrd="0" presId="urn:microsoft.com/office/officeart/2005/8/layout/hProcess4"/>
     <dgm:cxn modelId="{A29646BD-6AE5-4D34-869A-36A9725DDBF3}" srcId="{D4F9471E-5DB8-4527-8A9A-3BA1BC9BC03D}" destId="{F671BBA3-D45D-4509-982C-C5515B0DCAB4}" srcOrd="2" destOrd="0" parTransId="{D64BB036-4186-44AC-B8D2-FD20EC315433}" sibTransId="{486DFC96-35CB-4115-B620-6ED4B09F08B7}"/>
     <dgm:cxn modelId="{C01AB7C0-EDA4-2F4A-8C6C-892B685F58E8}" type="presOf" srcId="{F671BBA3-D45D-4509-982C-C5515B0DCAB4}" destId="{E5EBECDA-B2A2-1A46-872A-670086EE71E5}" srcOrd="0" destOrd="2" presId="urn:microsoft.com/office/officeart/2005/8/layout/hProcess4"/>
     <dgm:cxn modelId="{BDF0B3CA-1456-6C44-B1CC-965781A786CD}" srcId="{A127E4B3-65AD-4248-95B2-95D5289D7EA9}" destId="{AC1C4931-EEA2-E343-8BA4-1A9CD4B76DDA}" srcOrd="0" destOrd="0" parTransId="{610A01B0-C715-A64B-BF61-C1FDDCDC9160}" sibTransId="{47E1B64B-7FE6-D843-8E60-74658736FE62}"/>
     <dgm:cxn modelId="{BB8F7CD1-5120-0648-8B95-6150A54C57E7}" type="presOf" srcId="{A4305718-53E2-4A7F-804A-6F3B3A68EDA1}" destId="{42D63F66-5DD2-A047-8839-9A8F5BE3BB79}" srcOrd="1" destOrd="1" presId="urn:microsoft.com/office/officeart/2005/8/layout/hProcess4"/>
-    <dgm:cxn modelId="{D861ADD8-5F0C-AD44-A08B-07166C030EC8}" srcId="{939A1577-2324-43EB-B7C5-B0BEC8FE22DE}" destId="{E5852962-6E45-A643-BB41-0565DE04E888}" srcOrd="1" destOrd="0" parTransId="{BD1F6127-7013-A048-A8AB-EC7EB35F7124}" sibTransId="{A0A9B050-7D96-7E42-9D43-C6A5296F0497}"/>
+    <dgm:cxn modelId="{D861ADD8-5F0C-AD44-A08B-07166C030EC8}" srcId="{939A1577-2324-43EB-B7C5-B0BEC8FE22DE}" destId="{E5852962-6E45-A643-BB41-0565DE04E888}" srcOrd="2" destOrd="0" parTransId="{BD1F6127-7013-A048-A8AB-EC7EB35F7124}" sibTransId="{A0A9B050-7D96-7E42-9D43-C6A5296F0497}"/>
     <dgm:cxn modelId="{59DBBBD8-B7FC-E840-8989-493236A3A293}" type="presOf" srcId="{A4305718-53E2-4A7F-804A-6F3B3A68EDA1}" destId="{E5EBECDA-B2A2-1A46-872A-670086EE71E5}" srcOrd="0" destOrd="1" presId="urn:microsoft.com/office/officeart/2005/8/layout/hProcess4"/>
     <dgm:cxn modelId="{F783DEE3-F4DF-40F5-A322-430FF15CB4FB}" type="presOf" srcId="{A127E4B3-65AD-4248-95B2-95D5289D7EA9}" destId="{6C29B79F-2D3A-4853-8A7F-3EBEA7DAF6D1}" srcOrd="0" destOrd="0" presId="urn:microsoft.com/office/officeart/2005/8/layout/hProcess4"/>
     <dgm:cxn modelId="{9E9638E8-0DB0-A740-8B49-9BBE3FB39396}" type="presOf" srcId="{1B3290C7-72D7-4746-9957-7044F630C828}" destId="{6C198CF6-4B48-EC47-9895-532AAD4630E7}" srcOrd="0" destOrd="0" presId="urn:microsoft.com/office/officeart/2005/8/layout/hProcess4"/>
@@ -4309,6 +4354,24 @@
           <a:r>
             <a:rPr lang="de-DE" sz="1100" kern="1200" dirty="0"/>
             <a:t>Zugriffoptionen auf Betreiberkonto</a:t>
+          </a:r>
+        </a:p>
+        <a:p>
+          <a:pPr marL="57150" lvl="1" indent="-57150" algn="l" defTabSz="488950">
+            <a:lnSpc>
+              <a:spcPct val="90000"/>
+            </a:lnSpc>
+            <a:spcBef>
+              <a:spcPct val="0"/>
+            </a:spcBef>
+            <a:spcAft>
+              <a:spcPct val="15000"/>
+            </a:spcAft>
+            <a:buChar char="•"/>
+          </a:pPr>
+          <a:r>
+            <a:rPr lang="de-DE" sz="1100" kern="1200" dirty="0"/>
+            <a:t>Erfassung der Stammdaten</a:t>
           </a:r>
         </a:p>
         <a:p>
@@ -15241,13 +15304,8 @@
             </a:pPr>
             <a:r>
               <a:rPr lang="de-DE" dirty="0"/>
-              <a:t>Pilotinstallation in Zusammenarbeit </a:t>
-            </a:r>
-            <a:r>
-              <a:rPr lang="de-DE"/>
-              <a:t>mit Kassenhändler</a:t>
-            </a:r>
-            <a:endParaRPr lang="de-DE" dirty="0"/>
+              <a:t>Pilotinstallation in Zusammenarbeit mit Kassenhändler</a:t>
+            </a:r>
           </a:p>
           <a:p>
             <a:pPr>
@@ -16097,7 +16155,7 @@
             <p:ph idx="1"/>
             <p:extLst>
               <p:ext uri="{D42A27DB-BD31-4B8C-83A1-F6EECF244321}">
-                <p14:modId xmlns:p14="http://schemas.microsoft.com/office/powerpoint/2010/main" val="322269447"/>
+                <p14:modId xmlns:p14="http://schemas.microsoft.com/office/powerpoint/2010/main" val="1766808333"/>
               </p:ext>
             </p:extLst>
           </p:nvPr>
@@ -19568,6 +19626,12 @@
 </file>
 
 <file path=customXml/item1.xml><?xml version="1.0" encoding="utf-8"?>
+<p:properties xmlns:p="http://schemas.microsoft.com/office/2006/metadata/properties" xmlns:xsi="http://www.w3.org/2001/XMLSchema-instance" xmlns:pc="http://schemas.microsoft.com/office/infopath/2007/PartnerControls">
+  <documentManagement/>
+</p:properties>
+</file>
+
+<file path=customXml/item2.xml><?xml version="1.0" encoding="utf-8"?>
 <ct:contentTypeSchema xmlns:ct="http://schemas.microsoft.com/office/2006/metadata/contentType" xmlns:ma="http://schemas.microsoft.com/office/2006/metadata/properties/metaAttributes" ct:_="" ma:_="" ma:contentTypeName="Document" ma:contentTypeID="0x01010003A087929988544A956B845A242A1874" ma:contentTypeVersion="9" ma:contentTypeDescription="Create a new document." ma:contentTypeScope="" ma:versionID="a063f29419c0dc871a57124984a5c02e">
   <xsd:schema xmlns:xsd="http://www.w3.org/2001/XMLSchema" xmlns:xs="http://www.w3.org/2001/XMLSchema" xmlns:p="http://schemas.microsoft.com/office/2006/metadata/properties" xmlns:ns2="c3142773-ea53-476f-8961-6b85122cde25" targetNamespace="http://schemas.microsoft.com/office/2006/metadata/properties" ma:root="true" ma:fieldsID="a552620fe450120d7f85de4f65b137a4" ns2:_="">
     <xsd:import namespace="c3142773-ea53-476f-8961-6b85122cde25"/>
@@ -19745,12 +19809,6 @@
 </ct:contentTypeSchema>
 </file>
 
-<file path=customXml/item2.xml><?xml version="1.0" encoding="utf-8"?>
-<p:properties xmlns:p="http://schemas.microsoft.com/office/2006/metadata/properties" xmlns:xsi="http://www.w3.org/2001/XMLSchema-instance" xmlns:pc="http://schemas.microsoft.com/office/infopath/2007/PartnerControls">
-  <documentManagement/>
-</p:properties>
-</file>
-
 <file path=customXml/item3.xml><?xml version="1.0" encoding="utf-8"?>
 <?mso-contentType ?>
 <FormTemplates xmlns="http://schemas.microsoft.com/sharepoint/v3/contenttype/forms">
@@ -19761,6 +19819,15 @@
 </file>
 
 <file path=customXml/itemProps1.xml><?xml version="1.0" encoding="utf-8"?>
+<ds:datastoreItem xmlns:ds="http://schemas.openxmlformats.org/officeDocument/2006/customXml" ds:itemID="{A770BCC9-0480-4A5F-A5A5-05648EB42497}">
+  <ds:schemaRefs>
+    <ds:schemaRef ds:uri="http://schemas.microsoft.com/office/2006/metadata/properties"/>
+    <ds:schemaRef ds:uri="http://schemas.microsoft.com/office/infopath/2007/PartnerControls"/>
+  </ds:schemaRefs>
+</ds:datastoreItem>
+</file>
+
+<file path=customXml/itemProps2.xml><?xml version="1.0" encoding="utf-8"?>
 <ds:datastoreItem xmlns:ds="http://schemas.openxmlformats.org/officeDocument/2006/customXml" ds:itemID="{4A4E1077-0687-4F67-BE9D-7A4D4029BB02}">
   <ds:schemaRefs>
     <ds:schemaRef ds:uri="http://schemas.microsoft.com/office/2006/metadata/contentType"/>
@@ -19778,15 +19845,6 @@
 </ds:datastoreItem>
 </file>
 
-<file path=customXml/itemProps2.xml><?xml version="1.0" encoding="utf-8"?>
-<ds:datastoreItem xmlns:ds="http://schemas.openxmlformats.org/officeDocument/2006/customXml" ds:itemID="{A770BCC9-0480-4A5F-A5A5-05648EB42497}">
-  <ds:schemaRefs>
-    <ds:schemaRef ds:uri="http://schemas.microsoft.com/office/2006/metadata/properties"/>
-    <ds:schemaRef ds:uri="http://schemas.microsoft.com/office/infopath/2007/PartnerControls"/>
-  </ds:schemaRefs>
-</ds:datastoreItem>
-</file>
-
 <file path=customXml/itemProps3.xml><?xml version="1.0" encoding="utf-8"?>
 <ds:datastoreItem xmlns:ds="http://schemas.openxmlformats.org/officeDocument/2006/customXml" ds:itemID="{3F407387-4BEA-45E7-A546-EAF24BCEADF4}">
   <ds:schemaRefs>

</xml_diff>

<commit_message>
improve images in pos-creator presentation
</commit_message>
<xml_diff>
--- a/for-poscreators/presentation/media/lead-presentation-creator-de.pptx
+++ b/for-poscreators/presentation/media/lead-presentation-creator-de.pptx
@@ -6334,7 +6334,7 @@
           <a:p>
             <a:fld id="{E52F4C69-7549-4A71-BB0C-341D25F594E8}" type="datetime1">
               <a:rPr lang="de-AT" smtClean="0"/>
-              <a:t>20.10.20</a:t>
+              <a:t>23.10.20</a:t>
             </a:fld>
             <a:endParaRPr lang="de-AT" dirty="0"/>
           </a:p>
@@ -13947,10 +13947,10 @@
       </p:pic>
       <p:pic>
         <p:nvPicPr>
-          <p:cNvPr id="10" name="Picture 9" descr="A picture containing diagram&#10;&#10;Description automatically generated">
+          <p:cNvPr id="4" name="Picture 3" descr="A picture containing diagram&#10;&#10;Description automatically generated">
             <a:extLst>
               <a:ext uri="{FF2B5EF4-FFF2-40B4-BE49-F238E27FC236}">
-                <a16:creationId xmlns:a16="http://schemas.microsoft.com/office/drawing/2014/main" id="{C958576E-2164-4145-8A4F-CAE86C6F837C}"/>
+                <a16:creationId xmlns:a16="http://schemas.microsoft.com/office/drawing/2014/main" id="{8E056833-631A-F64C-A368-663F228F96E3}"/>
               </a:ext>
             </a:extLst>
           </p:cNvPr>
@@ -13973,8 +13973,8 @@
         </p:blipFill>
         <p:spPr>
           <a:xfrm>
-            <a:off x="394447" y="1789350"/>
-            <a:ext cx="11403106" cy="4059131"/>
+            <a:off x="539750" y="1454150"/>
+            <a:ext cx="11112500" cy="3949700"/>
           </a:xfrm>
           <a:prstGeom prst="rect">
             <a:avLst/>
@@ -14364,10 +14364,10 @@
       </p:pic>
       <p:pic>
         <p:nvPicPr>
-          <p:cNvPr id="9" name="Picture 8">
+          <p:cNvPr id="4" name="Picture 3" descr="A picture containing diagram&#10;&#10;Description automatically generated">
             <a:extLst>
               <a:ext uri="{FF2B5EF4-FFF2-40B4-BE49-F238E27FC236}">
-                <a16:creationId xmlns:a16="http://schemas.microsoft.com/office/drawing/2014/main" id="{21249C42-B425-8840-8EE1-16AEF6954F20}"/>
+                <a16:creationId xmlns:a16="http://schemas.microsoft.com/office/drawing/2014/main" id="{48491BA1-4032-E04A-A631-584001E4DD2C}"/>
               </a:ext>
             </a:extLst>
           </p:cNvPr>
@@ -14390,7 +14390,7 @@
         </p:blipFill>
         <p:spPr>
           <a:xfrm>
-            <a:off x="596900" y="2192482"/>
+            <a:off x="596900" y="1714500"/>
             <a:ext cx="10998200" cy="3429000"/>
           </a:xfrm>
           <a:prstGeom prst="rect">
@@ -18693,10 +18693,10 @@
       </p:pic>
       <p:pic>
         <p:nvPicPr>
-          <p:cNvPr id="17" name="Picture 16" descr="Graphical user interface, diagram&#10;&#10;Description automatically generated">
+          <p:cNvPr id="4" name="Picture 3" descr="Graphical user interface, diagram&#10;&#10;Description automatically generated">
             <a:extLst>
               <a:ext uri="{FF2B5EF4-FFF2-40B4-BE49-F238E27FC236}">
-                <a16:creationId xmlns:a16="http://schemas.microsoft.com/office/drawing/2014/main" id="{D5E00B30-BEB9-AB4E-90F0-09562562B500}"/>
+                <a16:creationId xmlns:a16="http://schemas.microsoft.com/office/drawing/2014/main" id="{C118D7A4-424D-1E46-9536-FD06D0039BC0}"/>
               </a:ext>
             </a:extLst>
           </p:cNvPr>
@@ -18719,8 +18719,8 @@
         </p:blipFill>
         <p:spPr>
           <a:xfrm>
-            <a:off x="745630" y="65753"/>
-            <a:ext cx="10700740" cy="6726494"/>
+            <a:off x="738100" y="123008"/>
+            <a:ext cx="10519064" cy="6611983"/>
           </a:xfrm>
           <a:prstGeom prst="rect">
             <a:avLst/>
@@ -19626,12 +19626,6 @@
 </file>
 
 <file path=customXml/item1.xml><?xml version="1.0" encoding="utf-8"?>
-<p:properties xmlns:p="http://schemas.microsoft.com/office/2006/metadata/properties" xmlns:xsi="http://www.w3.org/2001/XMLSchema-instance" xmlns:pc="http://schemas.microsoft.com/office/infopath/2007/PartnerControls">
-  <documentManagement/>
-</p:properties>
-</file>
-
-<file path=customXml/item2.xml><?xml version="1.0" encoding="utf-8"?>
 <ct:contentTypeSchema xmlns:ct="http://schemas.microsoft.com/office/2006/metadata/contentType" xmlns:ma="http://schemas.microsoft.com/office/2006/metadata/properties/metaAttributes" ct:_="" ma:_="" ma:contentTypeName="Document" ma:contentTypeID="0x01010003A087929988544A956B845A242A1874" ma:contentTypeVersion="9" ma:contentTypeDescription="Create a new document." ma:contentTypeScope="" ma:versionID="a063f29419c0dc871a57124984a5c02e">
   <xsd:schema xmlns:xsd="http://www.w3.org/2001/XMLSchema" xmlns:xs="http://www.w3.org/2001/XMLSchema" xmlns:p="http://schemas.microsoft.com/office/2006/metadata/properties" xmlns:ns2="c3142773-ea53-476f-8961-6b85122cde25" targetNamespace="http://schemas.microsoft.com/office/2006/metadata/properties" ma:root="true" ma:fieldsID="a552620fe450120d7f85de4f65b137a4" ns2:_="">
     <xsd:import namespace="c3142773-ea53-476f-8961-6b85122cde25"/>
@@ -19809,6 +19803,12 @@
 </ct:contentTypeSchema>
 </file>
 
+<file path=customXml/item2.xml><?xml version="1.0" encoding="utf-8"?>
+<p:properties xmlns:p="http://schemas.microsoft.com/office/2006/metadata/properties" xmlns:xsi="http://www.w3.org/2001/XMLSchema-instance" xmlns:pc="http://schemas.microsoft.com/office/infopath/2007/PartnerControls">
+  <documentManagement/>
+</p:properties>
+</file>
+
 <file path=customXml/item3.xml><?xml version="1.0" encoding="utf-8"?>
 <?mso-contentType ?>
 <FormTemplates xmlns="http://schemas.microsoft.com/sharepoint/v3/contenttype/forms">
@@ -19819,15 +19819,6 @@
 </file>
 
 <file path=customXml/itemProps1.xml><?xml version="1.0" encoding="utf-8"?>
-<ds:datastoreItem xmlns:ds="http://schemas.openxmlformats.org/officeDocument/2006/customXml" ds:itemID="{A770BCC9-0480-4A5F-A5A5-05648EB42497}">
-  <ds:schemaRefs>
-    <ds:schemaRef ds:uri="http://schemas.microsoft.com/office/2006/metadata/properties"/>
-    <ds:schemaRef ds:uri="http://schemas.microsoft.com/office/infopath/2007/PartnerControls"/>
-  </ds:schemaRefs>
-</ds:datastoreItem>
-</file>
-
-<file path=customXml/itemProps2.xml><?xml version="1.0" encoding="utf-8"?>
 <ds:datastoreItem xmlns:ds="http://schemas.openxmlformats.org/officeDocument/2006/customXml" ds:itemID="{4A4E1077-0687-4F67-BE9D-7A4D4029BB02}">
   <ds:schemaRefs>
     <ds:schemaRef ds:uri="http://schemas.microsoft.com/office/2006/metadata/contentType"/>
@@ -19845,6 +19836,15 @@
 </ds:datastoreItem>
 </file>
 
+<file path=customXml/itemProps2.xml><?xml version="1.0" encoding="utf-8"?>
+<ds:datastoreItem xmlns:ds="http://schemas.openxmlformats.org/officeDocument/2006/customXml" ds:itemID="{A770BCC9-0480-4A5F-A5A5-05648EB42497}">
+  <ds:schemaRefs>
+    <ds:schemaRef ds:uri="http://schemas.microsoft.com/office/2006/metadata/properties"/>
+    <ds:schemaRef ds:uri="http://schemas.microsoft.com/office/infopath/2007/PartnerControls"/>
+  </ds:schemaRefs>
+</ds:datastoreItem>
+</file>
+
 <file path=customXml/itemProps3.xml><?xml version="1.0" encoding="utf-8"?>
 <ds:datastoreItem xmlns:ds="http://schemas.openxmlformats.org/officeDocument/2006/customXml" ds:itemID="{3F407387-4BEA-45E7-A546-EAF24BCEADF4}">
   <ds:schemaRefs>

</xml_diff>